<commit_message>
more edits after lab mtg
</commit_message>
<xml_diff>
--- a/pptx_source/PhysiCell_ws2021_macOS_setup.pptx
+++ b/pptx_source/PhysiCell_ws2021_macOS_setup.pptx
@@ -5,7 +5,7 @@
     <p:sldMasterId id="2147483660" r:id="rId1"/>
   </p:sldMasterIdLst>
   <p:notesMasterIdLst>
-    <p:notesMasterId r:id="rId33"/>
+    <p:notesMasterId r:id="rId39"/>
   </p:notesMasterIdLst>
   <p:sldIdLst>
     <p:sldId id="257" r:id="rId2"/>
@@ -15,13 +15,13 @@
     <p:sldId id="275" r:id="rId6"/>
     <p:sldId id="276" r:id="rId7"/>
     <p:sldId id="279" r:id="rId8"/>
-    <p:sldId id="305" r:id="rId9"/>
+    <p:sldId id="308" r:id="rId9"/>
     <p:sldId id="281" r:id="rId10"/>
     <p:sldId id="282" r:id="rId11"/>
     <p:sldId id="283" r:id="rId12"/>
     <p:sldId id="284" r:id="rId13"/>
     <p:sldId id="285" r:id="rId14"/>
-    <p:sldId id="303" r:id="rId15"/>
+    <p:sldId id="309" r:id="rId15"/>
     <p:sldId id="295" r:id="rId16"/>
     <p:sldId id="298" r:id="rId17"/>
     <p:sldId id="294" r:id="rId18"/>
@@ -30,15 +30,21 @@
     <p:sldId id="301" r:id="rId21"/>
     <p:sldId id="297" r:id="rId22"/>
     <p:sldId id="302" r:id="rId23"/>
-    <p:sldId id="304" r:id="rId24"/>
+    <p:sldId id="310" r:id="rId24"/>
     <p:sldId id="286" r:id="rId25"/>
     <p:sldId id="287" r:id="rId26"/>
     <p:sldId id="288" r:id="rId27"/>
     <p:sldId id="289" r:id="rId28"/>
     <p:sldId id="290" r:id="rId29"/>
-    <p:sldId id="306" r:id="rId30"/>
-    <p:sldId id="278" r:id="rId31"/>
-    <p:sldId id="272" r:id="rId32"/>
+    <p:sldId id="311" r:id="rId30"/>
+    <p:sldId id="306" r:id="rId31"/>
+    <p:sldId id="307" r:id="rId32"/>
+    <p:sldId id="312" r:id="rId33"/>
+    <p:sldId id="313" r:id="rId34"/>
+    <p:sldId id="315" r:id="rId35"/>
+    <p:sldId id="314" r:id="rId36"/>
+    <p:sldId id="278" r:id="rId37"/>
+    <p:sldId id="272" r:id="rId38"/>
   </p:sldIdLst>
   <p:sldSz cx="9144000" cy="5143500" type="screen16x9"/>
   <p:notesSz cx="6858000" cy="9144000"/>
@@ -4015,16 +4021,8 @@
           <a:lstStyle/>
           <a:p>
             <a:r>
-              <a:rPr lang="en-US" dirty="0">
-                <a:solidFill>
-                  <a:schemeClr val="tx1"/>
-                </a:solidFill>
-              </a:rPr>
-              <a:t>Session 1:</a:t>
-            </a:r>
-            <a:r>
-              <a:rPr lang="en-US" dirty="0"/>
-              <a:t> Setting up MacOS  </a:t>
+              <a:rPr lang="en-US" dirty="0"/>
+              <a:t>Setting up MacOS  </a:t>
             </a:r>
             <a:br>
               <a:rPr lang="en-US" dirty="0"/>
@@ -4332,11 +4330,7 @@
               <a:t>~/PhysiCell$ </a:t>
             </a:r>
             <a:r>
-              <a:rPr lang="en-US" sz="1100" dirty="0">
-                <a:highlight>
-                  <a:srgbClr val="FFFF00"/>
-                </a:highlight>
-              </a:rPr>
+              <a:rPr lang="en-US" sz="1100" b="1" dirty="0"/>
               <a:t>make</a:t>
             </a:r>
             <a:r>
@@ -4351,12 +4345,29 @@
               </a:spcBef>
               <a:buNone/>
             </a:pPr>
+            <a:endParaRPr lang="en-US" sz="1100" dirty="0"/>
+          </a:p>
+          <a:p>
+            <a:pPr marL="0" indent="0">
+              <a:spcBef>
+                <a:spcPts val="0"/>
+              </a:spcBef>
+              <a:buNone/>
+            </a:pPr>
             <a:r>
               <a:rPr lang="en-US" sz="1100" dirty="0">
                 <a:sym typeface="Wingdings" pitchFamily="2" charset="2"/>
               </a:rPr>
               <a:t>       You will see the following output:</a:t>
             </a:r>
+          </a:p>
+          <a:p>
+            <a:pPr marL="0" indent="0">
+              <a:spcBef>
+                <a:spcPts val="0"/>
+              </a:spcBef>
+              <a:buNone/>
+            </a:pPr>
             <a:endParaRPr lang="en-US" sz="1100" dirty="0"/>
           </a:p>
           <a:p>
@@ -4973,7 +4984,7 @@
         </p:nvSpPr>
         <p:spPr>
           <a:xfrm>
-            <a:off x="6291743" y="2332139"/>
+            <a:off x="6334076" y="2696206"/>
             <a:ext cx="285226" cy="604008"/>
           </a:xfrm>
           <a:prstGeom prst="downArrow">
@@ -5027,7 +5038,7 @@
         </p:nvSpPr>
         <p:spPr>
           <a:xfrm>
-            <a:off x="5570290" y="1873028"/>
+            <a:off x="5612623" y="2237095"/>
             <a:ext cx="3009157" cy="400110"/>
           </a:xfrm>
           <a:prstGeom prst="rect">
@@ -5151,17 +5162,22 @@
               <a:t>~/PhysiCell$ </a:t>
             </a:r>
             <a:r>
-              <a:rPr lang="en-US" sz="1100" dirty="0">
-                <a:highlight>
-                  <a:srgbClr val="FFFF00"/>
-                </a:highlight>
-              </a:rPr>
-              <a:t>heterogeneity</a:t>
+              <a:rPr lang="en-US" sz="1100" b="1" dirty="0"/>
+              <a:t>./heterogeneity       </a:t>
             </a:r>
             <a:r>
               <a:rPr lang="en-US" sz="1100" dirty="0"/>
-              <a:t>       # run the model</a:t>
-            </a:r>
+              <a:t># run the model</a:t>
+            </a:r>
+          </a:p>
+          <a:p>
+            <a:pPr marL="0" indent="0">
+              <a:spcBef>
+                <a:spcPts val="0"/>
+              </a:spcBef>
+              <a:buNone/>
+            </a:pPr>
+            <a:endParaRPr lang="en-US" sz="1100" dirty="0"/>
           </a:p>
           <a:p>
             <a:pPr marL="0" indent="0">
@@ -5185,8 +5201,17 @@
               </a:spcBef>
               <a:buNone/>
             </a:pPr>
-            <a:r>
-              <a:rPr lang="en-US" sz="1000" dirty="0"/>
+            <a:endParaRPr lang="en-US" sz="900" dirty="0"/>
+          </a:p>
+          <a:p>
+            <a:pPr marL="0" indent="0">
+              <a:spcBef>
+                <a:spcPts val="0"/>
+              </a:spcBef>
+              <a:buNone/>
+            </a:pPr>
+            <a:r>
+              <a:rPr lang="en-US" sz="900" dirty="0"/>
               <a:t>Oncoprotein summary: </a:t>
             </a:r>
           </a:p>
@@ -5198,7 +5223,7 @@
               <a:buNone/>
             </a:pPr>
             <a:r>
-              <a:rPr lang="en-US" sz="1000" dirty="0"/>
+              <a:rPr lang="en-US" sz="900" dirty="0"/>
               <a:t>===================</a:t>
             </a:r>
           </a:p>
@@ -5210,7 +5235,7 @@
               <a:buNone/>
             </a:pPr>
             <a:r>
-              <a:rPr lang="en-US" sz="1000" dirty="0"/>
+              <a:rPr lang="en-US" sz="900" dirty="0"/>
               <a:t>mean: 1.00687</a:t>
             </a:r>
           </a:p>
@@ -5222,7 +5247,7 @@
               <a:buNone/>
             </a:pPr>
             <a:r>
-              <a:rPr lang="en-US" sz="1000" dirty="0"/>
+              <a:rPr lang="en-US" sz="900" dirty="0"/>
               <a:t>standard deviation: 0.250737</a:t>
             </a:r>
           </a:p>
@@ -5234,23 +5259,23 @@
               <a:buNone/>
             </a:pPr>
             <a:r>
-              <a:rPr lang="en-US" sz="1000" dirty="0"/>
+              <a:rPr lang="en-US" sz="900" dirty="0"/>
               <a:t>[min max]: [0.205535 1.71906]</a:t>
             </a:r>
             <a:br>
-              <a:rPr lang="en-US" sz="1000" dirty="0"/>
+              <a:rPr lang="en-US" sz="900" dirty="0"/>
             </a:br>
-            <a:endParaRPr lang="en-US" sz="1000" dirty="0"/>
-          </a:p>
-          <a:p>
-            <a:pPr marL="0" indent="0">
-              <a:spcBef>
-                <a:spcPts val="0"/>
-              </a:spcBef>
-              <a:buNone/>
-            </a:pPr>
-            <a:r>
-              <a:rPr lang="en-US" sz="1000" dirty="0"/>
+            <a:endParaRPr lang="en-US" sz="900" dirty="0"/>
+          </a:p>
+          <a:p>
+            <a:pPr marL="0" indent="0">
+              <a:spcBef>
+                <a:spcPts val="0"/>
+              </a:spcBef>
+              <a:buNone/>
+            </a:pPr>
+            <a:r>
+              <a:rPr lang="en-US" sz="900" dirty="0"/>
               <a:t>Using PhysiCell version 1.9.0</a:t>
             </a:r>
           </a:p>
@@ -5262,7 +5287,7 @@
               <a:buNone/>
             </a:pPr>
             <a:r>
-              <a:rPr lang="en-US" sz="1000" dirty="0"/>
+              <a:rPr lang="en-US" sz="900" dirty="0"/>
               <a:t>Please cite DOI: 10.1371/journal.pcbi.1005991</a:t>
             </a:r>
           </a:p>
@@ -5274,41 +5299,41 @@
               <a:buNone/>
             </a:pPr>
             <a:r>
-              <a:rPr lang="en-US" sz="1000" dirty="0"/>
+              <a:rPr lang="en-US" sz="900" dirty="0"/>
               <a:t>Project website: http://</a:t>
             </a:r>
             <a:r>
-              <a:rPr lang="en-US" sz="1000" dirty="0" err="1"/>
+              <a:rPr lang="en-US" sz="900" dirty="0" err="1"/>
               <a:t>PhysiCell.MathCancer.org</a:t>
             </a:r>
-            <a:endParaRPr lang="en-US" sz="1000" dirty="0"/>
-          </a:p>
-          <a:p>
-            <a:pPr marL="0" indent="0">
-              <a:spcBef>
-                <a:spcPts val="0"/>
-              </a:spcBef>
-              <a:buNone/>
-            </a:pPr>
-            <a:endParaRPr lang="en-US" sz="1000" dirty="0"/>
-          </a:p>
-          <a:p>
-            <a:pPr marL="0" indent="0">
-              <a:spcBef>
-                <a:spcPts val="0"/>
-              </a:spcBef>
-              <a:buNone/>
-            </a:pPr>
-            <a:r>
-              <a:rPr lang="en-US" sz="1000" dirty="0"/>
+            <a:endParaRPr lang="en-US" sz="900" dirty="0"/>
+          </a:p>
+          <a:p>
+            <a:pPr marL="0" indent="0">
+              <a:spcBef>
+                <a:spcPts val="0"/>
+              </a:spcBef>
+              <a:buNone/>
+            </a:pPr>
+            <a:endParaRPr lang="en-US" sz="900" dirty="0"/>
+          </a:p>
+          <a:p>
+            <a:pPr marL="0" indent="0">
+              <a:spcBef>
+                <a:spcPts val="0"/>
+              </a:spcBef>
+              <a:buNone/>
+            </a:pPr>
+            <a:r>
+              <a:rPr lang="en-US" sz="900" dirty="0"/>
               <a:t>See </a:t>
             </a:r>
             <a:r>
-              <a:rPr lang="en-US" sz="1000" dirty="0" err="1"/>
+              <a:rPr lang="en-US" sz="900" dirty="0" err="1"/>
               <a:t>ALL_CITATIONS.txt</a:t>
             </a:r>
             <a:r>
-              <a:rPr lang="en-US" sz="1000" dirty="0"/>
+              <a:rPr lang="en-US" sz="900" dirty="0"/>
               <a:t> for this list.</a:t>
             </a:r>
           </a:p>
@@ -5320,7 +5345,7 @@
               <a:buNone/>
             </a:pPr>
             <a:r>
-              <a:rPr lang="en-US" sz="1000" dirty="0"/>
+              <a:rPr lang="en-US" sz="900" dirty="0"/>
               <a:t>current simulated time: 0 min (max: 64800 min)</a:t>
             </a:r>
           </a:p>
@@ -5332,7 +5357,7 @@
               <a:buNone/>
             </a:pPr>
             <a:r>
-              <a:rPr lang="en-US" sz="1000" dirty="0"/>
+              <a:rPr lang="en-US" sz="900" dirty="0"/>
               <a:t>total agents: 890</a:t>
             </a:r>
           </a:p>
@@ -5344,7 +5369,7 @@
               <a:buNone/>
             </a:pPr>
             <a:r>
-              <a:rPr lang="en-US" sz="1000" dirty="0"/>
+              <a:rPr lang="en-US" sz="900" dirty="0"/>
               <a:t>interval wall time: 0 days, 0 hours, 0 minutes, and 2.1e-05 seconds </a:t>
             </a:r>
           </a:p>
@@ -5356,39 +5381,39 @@
               <a:buNone/>
             </a:pPr>
             <a:r>
-              <a:rPr lang="en-US" sz="1000" dirty="0"/>
+              <a:rPr lang="en-US" sz="900" dirty="0"/>
               <a:t>total wall time: 0 days, 0 hours, 0 minutes, and 2.4e-05 seconds </a:t>
             </a:r>
             <a:br>
-              <a:rPr lang="en-US" sz="1000" dirty="0"/>
+              <a:rPr lang="en-US" sz="900" dirty="0"/>
             </a:br>
-            <a:endParaRPr lang="en-US" sz="1000" dirty="0"/>
-          </a:p>
-          <a:p>
-            <a:pPr marL="0" indent="0">
-              <a:spcBef>
-                <a:spcPts val="0"/>
-              </a:spcBef>
-              <a:buNone/>
-            </a:pPr>
-            <a:r>
-              <a:rPr lang="en-US" sz="1000" dirty="0"/>
+            <a:endParaRPr lang="en-US" sz="900" dirty="0"/>
+          </a:p>
+          <a:p>
+            <a:pPr marL="0" indent="0">
+              <a:spcBef>
+                <a:spcPts val="0"/>
+              </a:spcBef>
+              <a:buNone/>
+            </a:pPr>
+            <a:r>
+              <a:rPr lang="en-US" sz="900" dirty="0"/>
               <a:t>Using method diffusion_decay_solver__constant_coefficients_LOD_2D (2D LOD with Thomas Algorithm) ... </a:t>
             </a:r>
             <a:br>
-              <a:rPr lang="en-US" sz="1000" dirty="0"/>
+              <a:rPr lang="en-US" sz="900" dirty="0"/>
             </a:br>
-            <a:endParaRPr lang="en-US" sz="1000" dirty="0"/>
-          </a:p>
-          <a:p>
-            <a:pPr marL="0" indent="0">
-              <a:spcBef>
-                <a:spcPts val="0"/>
-              </a:spcBef>
-              <a:buNone/>
-            </a:pPr>
-            <a:r>
-              <a:rPr lang="en-US" sz="1000" dirty="0"/>
+            <a:endParaRPr lang="en-US" sz="900" dirty="0"/>
+          </a:p>
+          <a:p>
+            <a:pPr marL="0" indent="0">
+              <a:spcBef>
+                <a:spcPts val="0"/>
+              </a:spcBef>
+              <a:buNone/>
+            </a:pPr>
+            <a:r>
+              <a:rPr lang="en-US" sz="900" dirty="0"/>
               <a:t>current simulated time: 60 min (max: 64800 min)</a:t>
             </a:r>
           </a:p>
@@ -5400,7 +5425,7 @@
               <a:buNone/>
             </a:pPr>
             <a:r>
-              <a:rPr lang="en-US" sz="1000" dirty="0"/>
+              <a:rPr lang="en-US" sz="900" dirty="0"/>
               <a:t>total agents: 896</a:t>
             </a:r>
           </a:p>
@@ -5412,7 +5437,7 @@
               <a:buNone/>
             </a:pPr>
             <a:r>
-              <a:rPr lang="en-US" sz="1000" dirty="0"/>
+              <a:rPr lang="en-US" sz="900" dirty="0"/>
               <a:t>interval wall time: 0 days, 0 hours, 0 minutes, and 1.89867 seconds </a:t>
             </a:r>
           </a:p>
@@ -5424,7 +5449,7 @@
               <a:buNone/>
             </a:pPr>
             <a:r>
-              <a:rPr lang="en-US" sz="1000" dirty="0"/>
+              <a:rPr lang="en-US" sz="900" dirty="0"/>
               <a:t>total wall time: 0 days, 0 hours, 0 minutes, and 1.8987 seconds</a:t>
             </a:r>
           </a:p>
@@ -5600,8 +5625,7 @@
               <a:t>You can press “control-c” to cancel the simulation and then type: </a:t>
             </a:r>
             <a:r>
-              <a:rPr lang="en-US" sz="1100" b="1" dirty="0">
-                <a:latin typeface="Courier New" panose="02070309020205020404" pitchFamily="49" charset="0"/>
+              <a:rPr lang="en-US" sz="1200" b="1" dirty="0">
                 <a:cs typeface="Courier New" panose="02070309020205020404" pitchFamily="49" charset="0"/>
               </a:rPr>
               <a:t>ls output  </a:t>
@@ -5974,7 +5998,7 @@
         </p:nvSpPr>
         <p:spPr>
           <a:xfrm>
-            <a:off x="956344" y="1006678"/>
+            <a:off x="805424" y="824691"/>
             <a:ext cx="8187655" cy="3494117"/>
           </a:xfrm>
         </p:spPr>
@@ -5985,7 +6009,7 @@
           <a:lstStyle/>
           <a:p>
             <a:r>
-              <a:rPr lang="en-US" sz="1800" dirty="0">
+              <a:rPr lang="en-US" sz="1400" dirty="0">
                 <a:solidFill>
                   <a:schemeClr val="tx1">
                     <a:alpha val="20000"/>
@@ -5998,7 +6022,7 @@
           <a:p>
             <a:pPr lvl="2"/>
             <a:r>
-              <a:rPr lang="en-US" sz="1800" dirty="0">
+              <a:rPr lang="en-US" sz="1400" dirty="0">
                 <a:solidFill>
                   <a:schemeClr val="tx1">
                     <a:alpha val="20000"/>
@@ -6010,7 +6034,7 @@
           </a:p>
           <a:p>
             <a:r>
-              <a:rPr lang="en-US" sz="1800" dirty="0">
+              <a:rPr lang="en-US" sz="1400" dirty="0">
                 <a:solidFill>
                   <a:schemeClr val="tx1">
                     <a:alpha val="20000"/>
@@ -6022,7 +6046,7 @@
           </a:p>
           <a:p>
             <a:r>
-              <a:rPr lang="en-US" sz="1800" dirty="0">
+              <a:rPr lang="en-US" sz="1400" dirty="0">
                 <a:solidFill>
                   <a:schemeClr val="tx1">
                     <a:alpha val="20000"/>
@@ -6034,13 +6058,13 @@
           </a:p>
           <a:p>
             <a:r>
-              <a:rPr lang="en-US" sz="1800" dirty="0"/>
+              <a:rPr lang="en-US" sz="1400" dirty="0"/>
               <a:t>Python 3 (using Anaconda distribution)</a:t>
             </a:r>
           </a:p>
           <a:p>
             <a:r>
-              <a:rPr lang="en-US" sz="1800" dirty="0">
+              <a:rPr lang="en-US" sz="1400" dirty="0">
                 <a:solidFill>
                   <a:schemeClr val="tx1">
                     <a:alpha val="20000"/>
@@ -6052,14 +6076,45 @@
           </a:p>
           <a:p>
             <a:r>
-              <a:rPr lang="en-US" sz="1800" dirty="0">
+              <a:rPr lang="en-US" sz="1400" dirty="0" err="1">
                 <a:solidFill>
                   <a:schemeClr val="tx1">
                     <a:alpha val="20000"/>
                   </a:schemeClr>
                 </a:solidFill>
               </a:rPr>
-              <a:t>Git (optional; probably pre-installed)</a:t>
+              <a:t>ImageMagick</a:t>
+            </a:r>
+            <a:endParaRPr lang="en-US" sz="1400" dirty="0">
+              <a:solidFill>
+                <a:schemeClr val="tx1">
+                  <a:alpha val="20000"/>
+                </a:schemeClr>
+              </a:solidFill>
+            </a:endParaRPr>
+          </a:p>
+          <a:p>
+            <a:r>
+              <a:rPr lang="en-US" sz="1400" dirty="0">
+                <a:solidFill>
+                  <a:schemeClr val="tx1">
+                    <a:alpha val="20000"/>
+                  </a:schemeClr>
+                </a:solidFill>
+              </a:rPr>
+              <a:t>PhysiCell Model Builder</a:t>
+            </a:r>
+          </a:p>
+          <a:p>
+            <a:r>
+              <a:rPr lang="en-US" sz="1400" dirty="0">
+                <a:solidFill>
+                  <a:schemeClr val="tx1">
+                    <a:alpha val="20000"/>
+                  </a:schemeClr>
+                </a:solidFill>
+              </a:rPr>
+              <a:t>Git (optional)</a:t>
             </a:r>
           </a:p>
         </p:txBody>
@@ -6067,7 +6122,7 @@
     </p:spTree>
     <p:extLst>
       <p:ext uri="{BB962C8B-B14F-4D97-AF65-F5344CB8AC3E}">
-        <p14:creationId xmlns:p14="http://schemas.microsoft.com/office/powerpoint/2010/main" val="4133867536"/>
+        <p14:creationId xmlns:p14="http://schemas.microsoft.com/office/powerpoint/2010/main" val="287449403"/>
       </p:ext>
     </p:extLst>
   </p:cSld>
@@ -6309,7 +6364,11 @@
             </a:pPr>
             <a:r>
               <a:rPr lang="en-US" sz="1400" dirty="0"/>
-              <a:t>~$ which python</a:t>
+              <a:t>~$ </a:t>
+            </a:r>
+            <a:r>
+              <a:rPr lang="en-US" sz="1400" b="1" dirty="0"/>
+              <a:t>which python</a:t>
             </a:r>
           </a:p>
           <a:p>
@@ -6350,7 +6409,11 @@
             </a:pPr>
             <a:r>
               <a:rPr lang="en-US" sz="1400" dirty="0"/>
-              <a:t>~$ python</a:t>
+              <a:t>~$ </a:t>
+            </a:r>
+            <a:r>
+              <a:rPr lang="en-US" sz="1400" b="1" dirty="0"/>
+              <a:t>python</a:t>
             </a:r>
           </a:p>
           <a:p>
@@ -6537,11 +6600,7 @@
               <a:t>~/Downloads$ </a:t>
             </a:r>
             <a:r>
-              <a:rPr lang="en-US" sz="1100" dirty="0">
-                <a:highlight>
-                  <a:srgbClr val="FFFF00"/>
-                </a:highlight>
-              </a:rPr>
+              <a:rPr lang="en-US" sz="1100" b="1" dirty="0"/>
               <a:t>/bin/bash Anaconda3-2021.05-MacOSX-x86_64.sh </a:t>
             </a:r>
           </a:p>
@@ -6776,7 +6835,11 @@
             </a:pPr>
             <a:r>
               <a:rPr lang="en-US" sz="1200" dirty="0"/>
-              <a:t>[no] &gt;&gt;&gt; yes</a:t>
+              <a:t>[no] &gt;&gt;&gt; </a:t>
+            </a:r>
+            <a:r>
+              <a:rPr lang="en-US" sz="1200" b="1" dirty="0"/>
+              <a:t>yes</a:t>
             </a:r>
           </a:p>
           <a:p>
@@ -7086,8 +7149,16 @@
               <a:buNone/>
             </a:pPr>
             <a:r>
+              <a:rPr lang="en-US" sz="1100" dirty="0">
+                <a:highlight>
+                  <a:srgbClr val="FFFF00"/>
+                </a:highlight>
+              </a:rPr>
+              <a:t>WARNING</a:t>
+            </a:r>
+            <a:r>
               <a:rPr lang="en-US" sz="1100" dirty="0"/>
-              <a:t>WARNING:</a:t>
+              <a:t>:</a:t>
             </a:r>
           </a:p>
           <a:p>
@@ -7238,6 +7309,91 @@
           </a:p>
         </p:txBody>
       </p:sp>
+      <p:sp>
+        <p:nvSpPr>
+          <p:cNvPr id="4" name="TextBox 3">
+            <a:extLst>
+              <a:ext uri="{FF2B5EF4-FFF2-40B4-BE49-F238E27FC236}">
+                <a16:creationId xmlns:a16="http://schemas.microsoft.com/office/drawing/2014/main" id="{3CB69482-AEC3-0C4B-A8E9-94B894A1CABA}"/>
+              </a:ext>
+            </a:extLst>
+          </p:cNvPr>
+          <p:cNvSpPr txBox="1"/>
+          <p:nvPr/>
+        </p:nvSpPr>
+        <p:spPr>
+          <a:xfrm>
+            <a:off x="3782291" y="1277186"/>
+            <a:ext cx="2618510" cy="400110"/>
+          </a:xfrm>
+          <a:prstGeom prst="rect">
+            <a:avLst/>
+          </a:prstGeom>
+          <a:noFill/>
+          <a:ln>
+            <a:solidFill>
+              <a:schemeClr val="tx1"/>
+            </a:solidFill>
+          </a:ln>
+        </p:spPr>
+        <p:txBody>
+          <a:bodyPr wrap="square" lIns="91440" tIns="0" rIns="91440" bIns="0" rtlCol="0">
+            <a:spAutoFit/>
+          </a:bodyPr>
+          <a:lstStyle/>
+          <a:p>
+            <a:r>
+              <a:rPr lang="en-US" dirty="0"/>
+              <a:t>It’s OK if you see this warning. You can disregard it for now.</a:t>
+            </a:r>
+          </a:p>
+        </p:txBody>
+      </p:sp>
+      <p:cxnSp>
+        <p:nvCxnSpPr>
+          <p:cNvPr id="5" name="Straight Arrow Connector 4">
+            <a:extLst>
+              <a:ext uri="{FF2B5EF4-FFF2-40B4-BE49-F238E27FC236}">
+                <a16:creationId xmlns:a16="http://schemas.microsoft.com/office/drawing/2014/main" id="{9F6AAAAA-D055-7040-BB48-EBBB19E02F24}"/>
+              </a:ext>
+            </a:extLst>
+          </p:cNvPr>
+          <p:cNvCxnSpPr>
+            <a:cxnSpLocks/>
+          </p:cNvCxnSpPr>
+          <p:nvPr/>
+        </p:nvCxnSpPr>
+        <p:spPr>
+          <a:xfrm flipV="1">
+            <a:off x="1615736" y="1537855"/>
+            <a:ext cx="2111137" cy="308700"/>
+          </a:xfrm>
+          <a:prstGeom prst="straightConnector1">
+            <a:avLst/>
+          </a:prstGeom>
+          <a:ln w="25400">
+            <a:solidFill>
+              <a:srgbClr val="FF0000"/>
+            </a:solidFill>
+            <a:headEnd type="stealth"/>
+            <a:tailEnd type="none"/>
+          </a:ln>
+        </p:spPr>
+        <p:style>
+          <a:lnRef idx="1">
+            <a:schemeClr val="accent1"/>
+          </a:lnRef>
+          <a:fillRef idx="0">
+            <a:schemeClr val="accent1"/>
+          </a:fillRef>
+          <a:effectRef idx="0">
+            <a:schemeClr val="accent1"/>
+          </a:effectRef>
+          <a:fontRef idx="minor">
+            <a:schemeClr val="tx1"/>
+          </a:fontRef>
+        </p:style>
+      </p:cxnSp>
     </p:spTree>
     <p:extLst>
       <p:ext uri="{BB962C8B-B14F-4D97-AF65-F5344CB8AC3E}">
@@ -7284,7 +7440,12 @@
             <p:ph type="title"/>
           </p:nvPr>
         </p:nvSpPr>
-        <p:spPr/>
+        <p:spPr>
+          <a:xfrm>
+            <a:off x="0" y="18920"/>
+            <a:ext cx="9144000" cy="731520"/>
+          </a:xfrm>
+        </p:spPr>
         <p:txBody>
           <a:bodyPr/>
           <a:lstStyle/>
@@ -7314,8 +7475,8 @@
         </p:nvSpPr>
         <p:spPr>
           <a:xfrm>
-            <a:off x="956344" y="1006678"/>
-            <a:ext cx="8187655" cy="3494117"/>
+            <a:off x="805424" y="824691"/>
+            <a:ext cx="7401027" cy="3494117"/>
           </a:xfrm>
         </p:spPr>
         <p:txBody>
@@ -7325,45 +7486,276 @@
           <a:lstStyle/>
           <a:p>
             <a:r>
-              <a:rPr lang="en-US" sz="1800" dirty="0"/>
+              <a:rPr lang="en-US" sz="1400" dirty="0"/>
               <a:t>Apple Intel CPU vs. Silicon (M1) CPU</a:t>
             </a:r>
           </a:p>
           <a:p>
             <a:pPr lvl="2"/>
             <a:r>
-              <a:rPr lang="en-US" sz="1800" dirty="0"/>
+              <a:rPr lang="en-US" sz="1400" dirty="0"/>
               <a:t> You may experience some problems with our setup instructions if you have the newer Apple Silicon CPU. If so, please contact us (see Support page at end).</a:t>
             </a:r>
           </a:p>
           <a:p>
-            <a:r>
-              <a:rPr lang="en-US" sz="1800" dirty="0"/>
+            <a:pPr marL="346075" lvl="2" indent="0">
+              <a:buNone/>
+            </a:pPr>
+            <a:endParaRPr lang="en-US" sz="1400" dirty="0"/>
+          </a:p>
+          <a:p>
+            <a:r>
+              <a:rPr lang="en-US" sz="1400" dirty="0"/>
               <a:t>OpenMP-enabled g++ (using Homebrew)</a:t>
             </a:r>
           </a:p>
           <a:p>
             <a:r>
-              <a:rPr lang="en-US" sz="1800" dirty="0"/>
+              <a:rPr lang="en-US" sz="1400" dirty="0"/>
               <a:t>Test building the default model (“heterogeneity”)</a:t>
             </a:r>
           </a:p>
           <a:p>
-            <a:r>
-              <a:rPr lang="en-US" sz="1800" dirty="0"/>
+            <a:pPr marL="0" indent="0">
+              <a:buNone/>
+            </a:pPr>
+            <a:endParaRPr lang="en-US" sz="1400" dirty="0"/>
+          </a:p>
+          <a:p>
+            <a:r>
+              <a:rPr lang="en-US" sz="1400" dirty="0"/>
               <a:t>Python 3 (using Anaconda distribution)</a:t>
             </a:r>
           </a:p>
           <a:p>
             <a:r>
-              <a:rPr lang="en-US" sz="1800" dirty="0"/>
+              <a:rPr lang="en-US" sz="1400" dirty="0"/>
               <a:t>Test building an intracellular model</a:t>
             </a:r>
           </a:p>
           <a:p>
             <a:r>
-              <a:rPr lang="en-US" sz="1800" dirty="0"/>
-              <a:t>Git (optional; probably pre-installed)</a:t>
+              <a:rPr lang="en-US" sz="1400" dirty="0" err="1"/>
+              <a:t>ImageMagick</a:t>
+            </a:r>
+            <a:endParaRPr lang="en-US" sz="1400" dirty="0"/>
+          </a:p>
+          <a:p>
+            <a:r>
+              <a:rPr lang="en-US" sz="1400" dirty="0"/>
+              <a:t>PhysiCell Model Builder</a:t>
+            </a:r>
+          </a:p>
+        </p:txBody>
+      </p:sp>
+      <p:cxnSp>
+        <p:nvCxnSpPr>
+          <p:cNvPr id="5" name="Straight Connector 4">
+            <a:extLst>
+              <a:ext uri="{FF2B5EF4-FFF2-40B4-BE49-F238E27FC236}">
+                <a16:creationId xmlns:a16="http://schemas.microsoft.com/office/drawing/2014/main" id="{F142AEC4-24E2-CB46-91FF-47B3EFBC0D86}"/>
+              </a:ext>
+            </a:extLst>
+          </p:cNvPr>
+          <p:cNvCxnSpPr/>
+          <p:nvPr/>
+        </p:nvCxnSpPr>
+        <p:spPr>
+          <a:xfrm>
+            <a:off x="805424" y="2695373"/>
+            <a:ext cx="5486400" cy="0"/>
+          </a:xfrm>
+          <a:prstGeom prst="line">
+            <a:avLst/>
+          </a:prstGeom>
+          <a:ln>
+            <a:solidFill>
+              <a:schemeClr val="tx1"/>
+            </a:solidFill>
+            <a:prstDash val="dash"/>
+          </a:ln>
+        </p:spPr>
+        <p:style>
+          <a:lnRef idx="1">
+            <a:schemeClr val="accent1"/>
+          </a:lnRef>
+          <a:fillRef idx="0">
+            <a:schemeClr val="accent1"/>
+          </a:fillRef>
+          <a:effectRef idx="0">
+            <a:schemeClr val="accent1"/>
+          </a:effectRef>
+          <a:fontRef idx="minor">
+            <a:schemeClr val="tx1"/>
+          </a:fontRef>
+        </p:style>
+      </p:cxnSp>
+      <p:sp>
+        <p:nvSpPr>
+          <p:cNvPr id="6" name="Right Brace 5">
+            <a:extLst>
+              <a:ext uri="{FF2B5EF4-FFF2-40B4-BE49-F238E27FC236}">
+                <a16:creationId xmlns:a16="http://schemas.microsoft.com/office/drawing/2014/main" id="{B7464D4F-16EC-B443-8A08-6F395C1D5B2F}"/>
+              </a:ext>
+            </a:extLst>
+          </p:cNvPr>
+          <p:cNvSpPr/>
+          <p:nvPr/>
+        </p:nvSpPr>
+        <p:spPr>
+          <a:xfrm>
+            <a:off x="5226442" y="1771373"/>
+            <a:ext cx="271531" cy="835011"/>
+          </a:xfrm>
+          <a:prstGeom prst="rightBrace">
+            <a:avLst/>
+          </a:prstGeom>
+          <a:noFill/>
+          <a:ln w="19050">
+            <a:solidFill>
+              <a:srgbClr val="FF0000"/>
+            </a:solidFill>
+          </a:ln>
+        </p:spPr>
+        <p:style>
+          <a:lnRef idx="1">
+            <a:schemeClr val="accent1"/>
+          </a:lnRef>
+          <a:fillRef idx="0">
+            <a:schemeClr val="accent1"/>
+          </a:fillRef>
+          <a:effectRef idx="0">
+            <a:schemeClr val="accent1"/>
+          </a:effectRef>
+          <a:fontRef idx="minor">
+            <a:schemeClr val="tx1"/>
+          </a:fontRef>
+        </p:style>
+        <p:txBody>
+          <a:bodyPr rtlCol="0" anchor="ctr"/>
+          <a:lstStyle/>
+          <a:p>
+            <a:pPr algn="ctr"/>
+            <a:endParaRPr lang="en-US"/>
+          </a:p>
+        </p:txBody>
+      </p:sp>
+      <p:sp>
+        <p:nvSpPr>
+          <p:cNvPr id="7" name="TextBox 6">
+            <a:extLst>
+              <a:ext uri="{FF2B5EF4-FFF2-40B4-BE49-F238E27FC236}">
+                <a16:creationId xmlns:a16="http://schemas.microsoft.com/office/drawing/2014/main" id="{8B2F152F-D436-9041-87B4-72B6F449B9EC}"/>
+              </a:ext>
+            </a:extLst>
+          </p:cNvPr>
+          <p:cNvSpPr txBox="1"/>
+          <p:nvPr/>
+        </p:nvSpPr>
+        <p:spPr>
+          <a:xfrm>
+            <a:off x="5527384" y="1942148"/>
+            <a:ext cx="929105" cy="505979"/>
+          </a:xfrm>
+          <a:prstGeom prst="rect">
+            <a:avLst/>
+          </a:prstGeom>
+          <a:noFill/>
+        </p:spPr>
+        <p:txBody>
+          <a:bodyPr wrap="square" lIns="0" tIns="0" rIns="0" bIns="0" rtlCol="0">
+            <a:spAutoFit/>
+          </a:bodyPr>
+          <a:lstStyle/>
+          <a:p>
+            <a:r>
+              <a:rPr lang="en-US" sz="1600" dirty="0"/>
+              <a:t>Minimal setup</a:t>
+            </a:r>
+          </a:p>
+        </p:txBody>
+      </p:sp>
+      <p:sp>
+        <p:nvSpPr>
+          <p:cNvPr id="8" name="Right Brace 7">
+            <a:extLst>
+              <a:ext uri="{FF2B5EF4-FFF2-40B4-BE49-F238E27FC236}">
+                <a16:creationId xmlns:a16="http://schemas.microsoft.com/office/drawing/2014/main" id="{AA84EFF6-E755-E445-A34A-7DAA11466603}"/>
+              </a:ext>
+            </a:extLst>
+          </p:cNvPr>
+          <p:cNvSpPr/>
+          <p:nvPr/>
+        </p:nvSpPr>
+        <p:spPr>
+          <a:xfrm>
+            <a:off x="7110459" y="1736738"/>
+            <a:ext cx="366787" cy="2291236"/>
+          </a:xfrm>
+          <a:prstGeom prst="rightBrace">
+            <a:avLst/>
+          </a:prstGeom>
+          <a:noFill/>
+          <a:ln w="19050">
+            <a:solidFill>
+              <a:srgbClr val="FF0000"/>
+            </a:solidFill>
+          </a:ln>
+        </p:spPr>
+        <p:style>
+          <a:lnRef idx="1">
+            <a:schemeClr val="accent1"/>
+          </a:lnRef>
+          <a:fillRef idx="0">
+            <a:schemeClr val="accent1"/>
+          </a:fillRef>
+          <a:effectRef idx="0">
+            <a:schemeClr val="accent1"/>
+          </a:effectRef>
+          <a:fontRef idx="minor">
+            <a:schemeClr val="tx1"/>
+          </a:fontRef>
+        </p:style>
+        <p:txBody>
+          <a:bodyPr rtlCol="0" anchor="ctr"/>
+          <a:lstStyle/>
+          <a:p>
+            <a:pPr algn="ctr"/>
+            <a:endParaRPr lang="en-US"/>
+          </a:p>
+        </p:txBody>
+      </p:sp>
+      <p:sp>
+        <p:nvSpPr>
+          <p:cNvPr id="10" name="TextBox 9">
+            <a:extLst>
+              <a:ext uri="{FF2B5EF4-FFF2-40B4-BE49-F238E27FC236}">
+                <a16:creationId xmlns:a16="http://schemas.microsoft.com/office/drawing/2014/main" id="{C2215EEA-6FC5-C742-8EA2-6EA1E5AE4138}"/>
+              </a:ext>
+            </a:extLst>
+          </p:cNvPr>
+          <p:cNvSpPr txBox="1"/>
+          <p:nvPr/>
+        </p:nvSpPr>
+        <p:spPr>
+          <a:xfrm>
+            <a:off x="7633685" y="2654852"/>
+            <a:ext cx="1360281" cy="492443"/>
+          </a:xfrm>
+          <a:prstGeom prst="rect">
+            <a:avLst/>
+          </a:prstGeom>
+          <a:noFill/>
+        </p:spPr>
+        <p:txBody>
+          <a:bodyPr wrap="square" lIns="0" tIns="0" rIns="0" bIns="0" rtlCol="0">
+            <a:spAutoFit/>
+          </a:bodyPr>
+          <a:lstStyle/>
+          <a:p>
+            <a:r>
+              <a:rPr lang="en-US" sz="1600" dirty="0"/>
+              <a:t>Traditional setup</a:t>
             </a:r>
           </a:p>
         </p:txBody>
@@ -7867,11 +8259,7 @@
               <a:t>~/Downloads$ </a:t>
             </a:r>
             <a:r>
-              <a:rPr lang="en-US" sz="1600" dirty="0">
-                <a:highlight>
-                  <a:srgbClr val="FFFF00"/>
-                </a:highlight>
-              </a:rPr>
+              <a:rPr lang="en-US" sz="1600" b="1" dirty="0"/>
               <a:t>which python</a:t>
             </a:r>
           </a:p>
@@ -8067,7 +8455,7 @@
         </p:nvSpPr>
         <p:spPr>
           <a:xfrm>
-            <a:off x="956344" y="1006678"/>
+            <a:off x="805424" y="824691"/>
             <a:ext cx="8187655" cy="3494117"/>
           </a:xfrm>
         </p:spPr>
@@ -8078,7 +8466,7 @@
           <a:lstStyle/>
           <a:p>
             <a:r>
-              <a:rPr lang="en-US" sz="1800" dirty="0">
+              <a:rPr lang="en-US" sz="1400" dirty="0">
                 <a:solidFill>
                   <a:schemeClr val="tx1">
                     <a:alpha val="20000"/>
@@ -8091,7 +8479,7 @@
           <a:p>
             <a:pPr lvl="2"/>
             <a:r>
-              <a:rPr lang="en-US" sz="1800" dirty="0">
+              <a:rPr lang="en-US" sz="1400" dirty="0">
                 <a:solidFill>
                   <a:schemeClr val="tx1">
                     <a:alpha val="20000"/>
@@ -8103,7 +8491,7 @@
           </a:p>
           <a:p>
             <a:r>
-              <a:rPr lang="en-US" sz="1800" dirty="0">
+              <a:rPr lang="en-US" sz="1400" dirty="0">
                 <a:solidFill>
                   <a:schemeClr val="tx1">
                     <a:alpha val="20000"/>
@@ -8115,7 +8503,7 @@
           </a:p>
           <a:p>
             <a:r>
-              <a:rPr lang="en-US" sz="1800" dirty="0">
+              <a:rPr lang="en-US" sz="1400" dirty="0">
                 <a:solidFill>
                   <a:schemeClr val="tx1">
                     <a:alpha val="20000"/>
@@ -8127,7 +8515,7 @@
           </a:p>
           <a:p>
             <a:r>
-              <a:rPr lang="en-US" sz="1800" dirty="0">
+              <a:rPr lang="en-US" sz="1400" dirty="0">
                 <a:solidFill>
                   <a:schemeClr val="tx1">
                     <a:alpha val="20000"/>
@@ -8139,20 +8527,39 @@
           </a:p>
           <a:p>
             <a:r>
-              <a:rPr lang="en-US" sz="1800" dirty="0"/>
+              <a:rPr lang="en-US" sz="1400" dirty="0"/>
               <a:t>Test building an intracellular model</a:t>
             </a:r>
           </a:p>
           <a:p>
             <a:r>
-              <a:rPr lang="en-US" sz="1800" dirty="0">
+              <a:rPr lang="en-US" sz="1400" dirty="0" err="1">
                 <a:solidFill>
                   <a:schemeClr val="tx1">
                     <a:alpha val="20000"/>
                   </a:schemeClr>
                 </a:solidFill>
               </a:rPr>
-              <a:t>Git (optional; probably pre-installed)</a:t>
+              <a:t>ImageMagick</a:t>
+            </a:r>
+            <a:endParaRPr lang="en-US" sz="1400" dirty="0">
+              <a:solidFill>
+                <a:schemeClr val="tx1">
+                  <a:alpha val="20000"/>
+                </a:schemeClr>
+              </a:solidFill>
+            </a:endParaRPr>
+          </a:p>
+          <a:p>
+            <a:r>
+              <a:rPr lang="en-US" sz="1400" dirty="0">
+                <a:solidFill>
+                  <a:schemeClr val="tx1">
+                    <a:alpha val="20000"/>
+                  </a:schemeClr>
+                </a:solidFill>
+              </a:rPr>
+              <a:t>PhysiCell Model Builder</a:t>
             </a:r>
           </a:p>
         </p:txBody>
@@ -8160,7 +8567,7 @@
     </p:spTree>
     <p:extLst>
       <p:ext uri="{BB962C8B-B14F-4D97-AF65-F5344CB8AC3E}">
-        <p14:creationId xmlns:p14="http://schemas.microsoft.com/office/powerpoint/2010/main" val="2828805123"/>
+        <p14:creationId xmlns:p14="http://schemas.microsoft.com/office/powerpoint/2010/main" val="2692933467"/>
       </p:ext>
     </p:extLst>
   </p:cSld>
@@ -8253,13 +8660,18 @@
               <a:t>~/PhysiCell$ </a:t>
             </a:r>
             <a:r>
-              <a:rPr lang="en-US" sz="1100" dirty="0">
-                <a:highlight>
-                  <a:srgbClr val="FFFF00"/>
-                </a:highlight>
-              </a:rPr>
+              <a:rPr lang="en-US" sz="1100" b="1" dirty="0"/>
               <a:t>make reset</a:t>
             </a:r>
+          </a:p>
+          <a:p>
+            <a:pPr marL="0" indent="0">
+              <a:spcBef>
+                <a:spcPts val="0"/>
+              </a:spcBef>
+              <a:buNone/>
+            </a:pPr>
+            <a:endParaRPr lang="en-US" sz="1100" b="1" dirty="0"/>
           </a:p>
           <a:p>
             <a:pPr marL="0" indent="0">
@@ -8500,13 +8912,18 @@
               <a:t>~/PhysiCell$ </a:t>
             </a:r>
             <a:r>
-              <a:rPr lang="en-US" sz="1100" dirty="0">
-                <a:highlight>
-                  <a:srgbClr val="FFFF00"/>
-                </a:highlight>
-              </a:rPr>
+              <a:rPr lang="en-US" sz="1100" b="1" dirty="0"/>
               <a:t>make list-projects</a:t>
             </a:r>
+          </a:p>
+          <a:p>
+            <a:pPr marL="0" indent="0">
+              <a:spcBef>
+                <a:spcPts val="0"/>
+              </a:spcBef>
+              <a:buNone/>
+            </a:pPr>
+            <a:endParaRPr lang="en-US" sz="1100" b="1" dirty="0"/>
           </a:p>
           <a:p>
             <a:pPr marL="0" indent="0">
@@ -8684,17 +9101,22 @@
               <a:buNone/>
             </a:pPr>
             <a:r>
-              <a:rPr lang="en-US" sz="900" dirty="0"/>
+              <a:rPr lang="en-US" sz="1000" dirty="0"/>
               <a:t>~/PhysiCell$ </a:t>
             </a:r>
             <a:r>
-              <a:rPr lang="en-US" sz="900" dirty="0">
-                <a:highlight>
-                  <a:srgbClr val="FFFF00"/>
-                </a:highlight>
-              </a:rPr>
+              <a:rPr lang="en-US" sz="1000" b="1" dirty="0"/>
               <a:t>make ode-energy-sample</a:t>
             </a:r>
+          </a:p>
+          <a:p>
+            <a:pPr marL="0" indent="0">
+              <a:spcBef>
+                <a:spcPts val="0"/>
+              </a:spcBef>
+              <a:buNone/>
+            </a:pPr>
+            <a:endParaRPr lang="en-US" sz="900" b="1" dirty="0"/>
           </a:p>
           <a:p>
             <a:pPr marL="0" indent="0">
@@ -9955,7 +10377,11 @@
               <a:buNone/>
             </a:pPr>
             <a:r>
-              <a:rPr lang="en-US" sz="900" dirty="0"/>
+              <a:rPr lang="en-US" sz="900" dirty="0">
+                <a:highlight>
+                  <a:srgbClr val="FFFF00"/>
+                </a:highlight>
+              </a:rPr>
               <a:t>created </a:t>
             </a:r>
             <a:r>
@@ -9989,14 +10415,27 @@
               <a:buNone/>
             </a:pPr>
             <a:r>
-              <a:rPr lang="en-US" sz="900" dirty="0"/>
+              <a:rPr lang="en-US" sz="1000" dirty="0"/>
               <a:t>~/PhysiCell$ </a:t>
             </a:r>
             <a:r>
-              <a:rPr lang="en-US" sz="900" dirty="0" err="1"/>
+              <a:rPr lang="en-US" sz="1000" b="1" dirty="0"/>
+              <a:t>./</a:t>
+            </a:r>
+            <a:r>
+              <a:rPr lang="en-US" sz="1000" b="1" dirty="0" err="1"/>
               <a:t>ode_energy</a:t>
             </a:r>
-            <a:endParaRPr lang="en-US" sz="900" dirty="0"/>
+            <a:endParaRPr lang="en-US" sz="1000" b="1" dirty="0"/>
+          </a:p>
+          <a:p>
+            <a:pPr marL="0" indent="0">
+              <a:spcBef>
+                <a:spcPts val="0"/>
+              </a:spcBef>
+              <a:buNone/>
+            </a:pPr>
+            <a:endParaRPr lang="en-US" sz="900" b="1" dirty="0"/>
           </a:p>
           <a:p>
             <a:pPr marL="0" indent="0">
@@ -10116,7 +10555,7 @@
         </p:nvSpPr>
         <p:spPr>
           <a:xfrm>
-            <a:off x="3229761" y="3531765"/>
+            <a:off x="3229761" y="3720625"/>
             <a:ext cx="159391" cy="671119"/>
           </a:xfrm>
           <a:prstGeom prst="rightBrace">
@@ -10166,7 +10605,7 @@
         </p:nvSpPr>
         <p:spPr>
           <a:xfrm>
-            <a:off x="3521865" y="3516384"/>
+            <a:off x="3496465" y="3720625"/>
             <a:ext cx="3450142" cy="600164"/>
           </a:xfrm>
           <a:prstGeom prst="rect">
@@ -10182,7 +10621,7 @@
           <a:p>
             <a:r>
               <a:rPr lang="en-US" dirty="0"/>
-              <a:t>When we try to run the model, we get an error, but it was expected and serves as a reminder if/when you ever see it again.</a:t>
+              <a:t>When we try to run the model, we get an error, but it was expected and serves as a reminder if/when you ever see it again. See next slide.</a:t>
             </a:r>
           </a:p>
         </p:txBody>
@@ -10279,29 +10718,26 @@
               <a:t>~/PhysiCell$ </a:t>
             </a:r>
             <a:r>
-              <a:rPr lang="en-US" sz="1000" dirty="0">
-                <a:highlight>
-                  <a:srgbClr val="FFFF00"/>
-                </a:highlight>
-              </a:rPr>
+              <a:rPr lang="en-US" sz="1000" b="1" dirty="0"/>
               <a:t>export DYLD_LIBRARY_PATH=$DYLD_LIBRARY_PATH:./addons/</a:t>
             </a:r>
             <a:r>
-              <a:rPr lang="en-US" sz="1000" dirty="0" err="1">
-                <a:highlight>
-                  <a:srgbClr val="FFFF00"/>
-                </a:highlight>
-              </a:rPr>
+              <a:rPr lang="en-US" sz="1000" b="1" dirty="0" err="1"/>
               <a:t>libRoadrunner</a:t>
             </a:r>
             <a:r>
-              <a:rPr lang="en-US" sz="1000" dirty="0">
-                <a:highlight>
-                  <a:srgbClr val="FFFF00"/>
-                </a:highlight>
-              </a:rPr>
+              <a:rPr lang="en-US" sz="1000" b="1" dirty="0"/>
               <a:t>/roadrunner/lib</a:t>
             </a:r>
+          </a:p>
+          <a:p>
+            <a:pPr marL="0" indent="0">
+              <a:spcBef>
+                <a:spcPts val="0"/>
+              </a:spcBef>
+              <a:buNone/>
+            </a:pPr>
+            <a:endParaRPr lang="en-US" sz="1000" b="1" dirty="0"/>
           </a:p>
           <a:p>
             <a:pPr marL="0" indent="0">
@@ -10315,10 +10751,23 @@
               <a:t>~/PhysiCell$ </a:t>
             </a:r>
             <a:r>
-              <a:rPr lang="en-US" sz="1000" dirty="0" err="1"/>
+              <a:rPr lang="en-US" sz="1000" b="1" dirty="0"/>
+              <a:t>./</a:t>
+            </a:r>
+            <a:r>
+              <a:rPr lang="en-US" sz="1000" b="1" dirty="0" err="1"/>
               <a:t>ode_energy</a:t>
             </a:r>
-            <a:endParaRPr lang="en-US" sz="1000" dirty="0"/>
+            <a:endParaRPr lang="en-US" sz="1000" b="1" dirty="0"/>
+          </a:p>
+          <a:p>
+            <a:pPr marL="0" indent="0">
+              <a:spcBef>
+                <a:spcPts val="0"/>
+              </a:spcBef>
+              <a:buNone/>
+            </a:pPr>
+            <a:endParaRPr lang="en-US" sz="1000" b="1" dirty="0"/>
           </a:p>
           <a:p>
             <a:pPr marL="0" indent="0">
@@ -10499,7 +10948,7 @@
         </p:nvSpPr>
         <p:spPr>
           <a:xfrm rot="6589593">
-            <a:off x="6523850" y="761307"/>
+            <a:off x="6533276" y="827295"/>
             <a:ext cx="191162" cy="649459"/>
           </a:xfrm>
           <a:prstGeom prst="downArrow">
@@ -10676,7 +11125,7 @@
         <p:spPr>
           <a:xfrm>
             <a:off x="218114" y="735702"/>
-            <a:ext cx="8707772" cy="1292662"/>
+            <a:ext cx="8707772" cy="2015936"/>
           </a:xfrm>
           <a:prstGeom prst="rect">
             <a:avLst/>
@@ -10806,6 +11255,56 @@
               </a:rPr>
               <a:t>zshenv</a:t>
             </a:r>
+            <a:endParaRPr lang="en-US" sz="1100" b="1" dirty="0">
+              <a:latin typeface="Courier New" panose="02070309020205020404" pitchFamily="49" charset="0"/>
+              <a:cs typeface="Courier New" panose="02070309020205020404" pitchFamily="49" charset="0"/>
+            </a:endParaRPr>
+          </a:p>
+          <a:p>
+            <a:pPr marL="0" indent="0">
+              <a:buNone/>
+            </a:pPr>
+            <a:endParaRPr lang="en-US" sz="1100" b="1" dirty="0">
+              <a:latin typeface="Courier New" panose="02070309020205020404" pitchFamily="49" charset="0"/>
+              <a:cs typeface="Courier New" panose="02070309020205020404" pitchFamily="49" charset="0"/>
+            </a:endParaRPr>
+          </a:p>
+          <a:p>
+            <a:pPr marL="0" indent="0">
+              <a:buNone/>
+            </a:pPr>
+            <a:endParaRPr lang="en-US" sz="1100" b="1" dirty="0">
+              <a:latin typeface="Courier New" panose="02070309020205020404" pitchFamily="49" charset="0"/>
+              <a:cs typeface="Courier New" panose="02070309020205020404" pitchFamily="49" charset="0"/>
+            </a:endParaRPr>
+          </a:p>
+          <a:p>
+            <a:r>
+              <a:rPr lang="en-US" sz="1400" dirty="0">
+                <a:cs typeface="Courier New" panose="02070309020205020404" pitchFamily="49" charset="0"/>
+              </a:rPr>
+              <a:t>Then when you start a </a:t>
+            </a:r>
+            <a:r>
+              <a:rPr lang="en-US" sz="1400" dirty="0">
+                <a:highlight>
+                  <a:srgbClr val="FFFF00"/>
+                </a:highlight>
+                <a:cs typeface="Courier New" panose="02070309020205020404" pitchFamily="49" charset="0"/>
+              </a:rPr>
+              <a:t>New</a:t>
+            </a:r>
+            <a:r>
+              <a:rPr lang="en-US" sz="1400" dirty="0">
+                <a:cs typeface="Courier New" panose="02070309020205020404" pitchFamily="49" charset="0"/>
+              </a:rPr>
+              <a:t> Terminal Shell window, this environment variable will be defined.</a:t>
+            </a:r>
+          </a:p>
+          <a:p>
+            <a:pPr marL="0" indent="0">
+              <a:buNone/>
+            </a:pPr>
             <a:endParaRPr lang="en-US" sz="1100" b="1" dirty="0">
               <a:latin typeface="Courier New" panose="02070309020205020404" pitchFamily="49" charset="0"/>
               <a:cs typeface="Courier New" panose="02070309020205020404" pitchFamily="49" charset="0"/>
@@ -10848,7 +11347,7 @@
           <p:cNvPr id="2" name="Title 1">
             <a:extLst>
               <a:ext uri="{FF2B5EF4-FFF2-40B4-BE49-F238E27FC236}">
-                <a16:creationId xmlns:a16="http://schemas.microsoft.com/office/drawing/2014/main" id="{6A279D37-B62F-714B-89C4-F3C8392D29DC}"/>
+                <a16:creationId xmlns:a16="http://schemas.microsoft.com/office/drawing/2014/main" id="{53A6FBB7-CD65-1E4B-9CBF-56F038F6A827}"/>
               </a:ext>
             </a:extLst>
           </p:cNvPr>
@@ -10865,10 +11364,9 @@
           <a:lstStyle/>
           <a:p>
             <a:r>
-              <a:rPr lang="en-US" dirty="0" err="1"/>
-              <a:t>ImageMagick</a:t>
-            </a:r>
-            <a:endParaRPr lang="en-US" dirty="0"/>
+              <a:rPr lang="en-US" dirty="0"/>
+              <a:t>Overview </a:t>
+            </a:r>
           </a:p>
         </p:txBody>
       </p:sp>
@@ -10877,7 +11375,7 @@
           <p:cNvPr id="3" name="Content Placeholder 2">
             <a:extLst>
               <a:ext uri="{FF2B5EF4-FFF2-40B4-BE49-F238E27FC236}">
-                <a16:creationId xmlns:a16="http://schemas.microsoft.com/office/drawing/2014/main" id="{EF8FE15D-1FA9-C442-A734-A76FCD711FFD}"/>
+                <a16:creationId xmlns:a16="http://schemas.microsoft.com/office/drawing/2014/main" id="{8B6A701D-A58F-5648-929D-C0F4C803C53A}"/>
               </a:ext>
             </a:extLst>
           </p:cNvPr>
@@ -10888,610 +11386,107 @@
             <p:ph idx="1"/>
           </p:nvPr>
         </p:nvSpPr>
-        <p:spPr/>
+        <p:spPr>
+          <a:xfrm>
+            <a:off x="805424" y="824691"/>
+            <a:ext cx="8187655" cy="3494117"/>
+          </a:xfrm>
+        </p:spPr>
         <p:txBody>
           <a:bodyPr>
             <a:normAutofit/>
           </a:bodyPr>
           <a:lstStyle/>
           <a:p>
-            <a:pPr marL="0" indent="0">
-              <a:spcBef>
-                <a:spcPts val="0"/>
-              </a:spcBef>
-              <a:buNone/>
-            </a:pPr>
-            <a:r>
-              <a:rPr lang="en-US" sz="1200" dirty="0">
-                <a:cs typeface="Courier New" panose="02070309020205020404" pitchFamily="49" charset="0"/>
-                <a:hlinkClick r:id="rId2"/>
-              </a:rPr>
-              <a:t>https://imagemagick.org/</a:t>
-            </a:r>
-            <a:r>
-              <a:rPr lang="en-US" sz="1200" dirty="0">
-                <a:cs typeface="Courier New" panose="02070309020205020404" pitchFamily="49" charset="0"/>
-              </a:rPr>
-              <a:t> - free, powerful image conversion, composing, editing software.</a:t>
-            </a:r>
-          </a:p>
-          <a:p>
-            <a:pPr marL="0" indent="0">
-              <a:spcBef>
-                <a:spcPts val="0"/>
-              </a:spcBef>
-              <a:buNone/>
-            </a:pPr>
-            <a:endParaRPr lang="en-US" sz="1200" b="1" dirty="0">
-              <a:latin typeface="Courier New" panose="02070309020205020404" pitchFamily="49" charset="0"/>
-              <a:cs typeface="Courier New" panose="02070309020205020404" pitchFamily="49" charset="0"/>
-            </a:endParaRPr>
-          </a:p>
-          <a:p>
-            <a:pPr marL="0" indent="0">
-              <a:spcBef>
-                <a:spcPts val="0"/>
-              </a:spcBef>
-              <a:buNone/>
-            </a:pPr>
-            <a:r>
-              <a:rPr lang="en-US" sz="1200" b="1" dirty="0">
-                <a:latin typeface="Courier New" panose="02070309020205020404" pitchFamily="49" charset="0"/>
-                <a:cs typeface="Courier New" panose="02070309020205020404" pitchFamily="49" charset="0"/>
-              </a:rPr>
-              <a:t>~/dev/PhysiCell_V.1.8.0_release/output$ </a:t>
-            </a:r>
-            <a:r>
-              <a:rPr lang="en-US" sz="1200" b="1" dirty="0">
-                <a:highlight>
-                  <a:srgbClr val="FFFF00"/>
-                </a:highlight>
-                <a:latin typeface="Courier New" panose="02070309020205020404" pitchFamily="49" charset="0"/>
-                <a:cs typeface="Courier New" panose="02070309020205020404" pitchFamily="49" charset="0"/>
-              </a:rPr>
-              <a:t>brew install </a:t>
-            </a:r>
-            <a:r>
-              <a:rPr lang="en-US" sz="1200" b="1" dirty="0" err="1">
-                <a:highlight>
-                  <a:srgbClr val="FFFF00"/>
-                </a:highlight>
-                <a:latin typeface="Courier New" panose="02070309020205020404" pitchFamily="49" charset="0"/>
-                <a:cs typeface="Courier New" panose="02070309020205020404" pitchFamily="49" charset="0"/>
-              </a:rPr>
-              <a:t>imagemagick</a:t>
-            </a:r>
-            <a:endParaRPr lang="en-US" sz="1200" b="1" dirty="0">
-              <a:highlight>
-                <a:srgbClr val="FFFF00"/>
-              </a:highlight>
-              <a:latin typeface="Courier New" panose="02070309020205020404" pitchFamily="49" charset="0"/>
-              <a:cs typeface="Courier New" panose="02070309020205020404" pitchFamily="49" charset="0"/>
-            </a:endParaRPr>
-          </a:p>
-          <a:p>
-            <a:pPr marL="0" indent="0">
-              <a:spcBef>
-                <a:spcPts val="0"/>
-              </a:spcBef>
-              <a:buNone/>
-            </a:pPr>
-            <a:r>
-              <a:rPr lang="en-US" sz="1200" dirty="0">
-                <a:cs typeface="Courier New" panose="02070309020205020404" pitchFamily="49" charset="0"/>
-              </a:rPr>
-              <a:t>     (probably will install lots of dependencies)</a:t>
-            </a:r>
-          </a:p>
-          <a:p>
-            <a:pPr marL="0" indent="0">
-              <a:spcBef>
-                <a:spcPts val="0"/>
-              </a:spcBef>
-              <a:buNone/>
-            </a:pPr>
-            <a:r>
-              <a:rPr lang="en-US" sz="1200" dirty="0">
-                <a:cs typeface="Courier New" panose="02070309020205020404" pitchFamily="49" charset="0"/>
-              </a:rPr>
-              <a:t>...</a:t>
-            </a:r>
-          </a:p>
-          <a:p>
-            <a:pPr marL="0" indent="0">
-              <a:spcBef>
-                <a:spcPts val="0"/>
-              </a:spcBef>
-              <a:buNone/>
-            </a:pPr>
-            <a:r>
-              <a:rPr lang="en-US" sz="1200" b="1" dirty="0">
-                <a:latin typeface="Courier New" panose="02070309020205020404" pitchFamily="49" charset="0"/>
-                <a:cs typeface="Courier New" panose="02070309020205020404" pitchFamily="49" charset="0"/>
-              </a:rPr>
-              <a:t>==&gt; Installing </a:t>
-            </a:r>
-            <a:r>
-              <a:rPr lang="en-US" sz="1200" b="1" dirty="0" err="1">
-                <a:latin typeface="Courier New" panose="02070309020205020404" pitchFamily="49" charset="0"/>
-                <a:cs typeface="Courier New" panose="02070309020205020404" pitchFamily="49" charset="0"/>
-              </a:rPr>
-              <a:t>imagemagick</a:t>
-            </a:r>
-            <a:r>
-              <a:rPr lang="en-US" sz="1200" b="1" dirty="0">
-                <a:latin typeface="Courier New" panose="02070309020205020404" pitchFamily="49" charset="0"/>
-                <a:cs typeface="Courier New" panose="02070309020205020404" pitchFamily="49" charset="0"/>
-              </a:rPr>
-              <a:t> dependency: </a:t>
-            </a:r>
-            <a:r>
-              <a:rPr lang="en-US" sz="1200" b="1" dirty="0" err="1">
-                <a:latin typeface="Courier New" panose="02070309020205020404" pitchFamily="49" charset="0"/>
-                <a:cs typeface="Courier New" panose="02070309020205020404" pitchFamily="49" charset="0"/>
-              </a:rPr>
-              <a:t>openexr</a:t>
-            </a:r>
-            <a:endParaRPr lang="en-US" sz="1200" b="1" dirty="0">
-              <a:latin typeface="Courier New" panose="02070309020205020404" pitchFamily="49" charset="0"/>
-              <a:cs typeface="Courier New" panose="02070309020205020404" pitchFamily="49" charset="0"/>
-            </a:endParaRPr>
-          </a:p>
-          <a:p>
-            <a:pPr marL="0" indent="0">
-              <a:spcBef>
-                <a:spcPts val="0"/>
-              </a:spcBef>
-              <a:buNone/>
-            </a:pPr>
-            <a:r>
-              <a:rPr lang="en-US" sz="1200" b="1" dirty="0">
-                <a:latin typeface="Courier New" panose="02070309020205020404" pitchFamily="49" charset="0"/>
-                <a:cs typeface="Courier New" panose="02070309020205020404" pitchFamily="49" charset="0"/>
-              </a:rPr>
-              <a:t>==&gt; Pouring </a:t>
-            </a:r>
-            <a:r>
-              <a:rPr lang="en-US" sz="1200" b="1" dirty="0" err="1">
-                <a:latin typeface="Courier New" panose="02070309020205020404" pitchFamily="49" charset="0"/>
-                <a:cs typeface="Courier New" panose="02070309020205020404" pitchFamily="49" charset="0"/>
-              </a:rPr>
-              <a:t>openexr</a:t>
-            </a:r>
-            <a:r>
-              <a:rPr lang="en-US" sz="1200" b="1" dirty="0">
-                <a:latin typeface="Courier New" panose="02070309020205020404" pitchFamily="49" charset="0"/>
-                <a:cs typeface="Courier New" panose="02070309020205020404" pitchFamily="49" charset="0"/>
-              </a:rPr>
-              <a:t>--3.0.5.mojave.bottle.tar.gz</a:t>
-            </a:r>
-          </a:p>
-          <a:p>
-            <a:pPr marL="0" indent="0">
-              <a:spcBef>
-                <a:spcPts val="0"/>
-              </a:spcBef>
-              <a:buNone/>
-            </a:pPr>
-            <a:r>
-              <a:rPr lang="en-US" sz="1200" b="1" dirty="0">
-                <a:latin typeface="Courier New" panose="02070309020205020404" pitchFamily="49" charset="0"/>
-                <a:cs typeface="Courier New" panose="02070309020205020404" pitchFamily="49" charset="0"/>
-              </a:rPr>
-              <a:t>🍺  /</a:t>
-            </a:r>
-            <a:r>
-              <a:rPr lang="en-US" sz="1200" b="1" dirty="0" err="1">
-                <a:latin typeface="Courier New" panose="02070309020205020404" pitchFamily="49" charset="0"/>
-                <a:cs typeface="Courier New" panose="02070309020205020404" pitchFamily="49" charset="0"/>
-              </a:rPr>
-              <a:t>usr</a:t>
-            </a:r>
-            <a:r>
-              <a:rPr lang="en-US" sz="1200" b="1" dirty="0">
-                <a:latin typeface="Courier New" panose="02070309020205020404" pitchFamily="49" charset="0"/>
-                <a:cs typeface="Courier New" panose="02070309020205020404" pitchFamily="49" charset="0"/>
-              </a:rPr>
-              <a:t>/local/Cellar/</a:t>
-            </a:r>
-            <a:r>
-              <a:rPr lang="en-US" sz="1200" b="1" dirty="0" err="1">
-                <a:latin typeface="Courier New" panose="02070309020205020404" pitchFamily="49" charset="0"/>
-                <a:cs typeface="Courier New" panose="02070309020205020404" pitchFamily="49" charset="0"/>
-              </a:rPr>
-              <a:t>openexr</a:t>
-            </a:r>
-            <a:r>
-              <a:rPr lang="en-US" sz="1200" b="1" dirty="0">
-                <a:latin typeface="Courier New" panose="02070309020205020404" pitchFamily="49" charset="0"/>
-                <a:cs typeface="Courier New" panose="02070309020205020404" pitchFamily="49" charset="0"/>
-              </a:rPr>
-              <a:t>/3.0.5: 176 files, 5.0MB</a:t>
-            </a:r>
-          </a:p>
-          <a:p>
-            <a:pPr marL="0" indent="0">
-              <a:spcBef>
-                <a:spcPts val="0"/>
-              </a:spcBef>
-              <a:buNone/>
-            </a:pPr>
-            <a:r>
-              <a:rPr lang="en-US" sz="1200" b="1" dirty="0">
-                <a:latin typeface="Courier New" panose="02070309020205020404" pitchFamily="49" charset="0"/>
-                <a:cs typeface="Courier New" panose="02070309020205020404" pitchFamily="49" charset="0"/>
-              </a:rPr>
-              <a:t>==&gt; Installing </a:t>
-            </a:r>
-            <a:r>
-              <a:rPr lang="en-US" sz="1200" b="1" dirty="0" err="1">
-                <a:latin typeface="Courier New" panose="02070309020205020404" pitchFamily="49" charset="0"/>
-                <a:cs typeface="Courier New" panose="02070309020205020404" pitchFamily="49" charset="0"/>
-              </a:rPr>
-              <a:t>imagemagick</a:t>
-            </a:r>
-            <a:r>
-              <a:rPr lang="en-US" sz="1200" b="1" dirty="0">
-                <a:latin typeface="Courier New" panose="02070309020205020404" pitchFamily="49" charset="0"/>
-                <a:cs typeface="Courier New" panose="02070309020205020404" pitchFamily="49" charset="0"/>
-              </a:rPr>
-              <a:t> dependency: </a:t>
-            </a:r>
-            <a:r>
-              <a:rPr lang="en-US" sz="1200" b="1" dirty="0" err="1">
-                <a:latin typeface="Courier New" panose="02070309020205020404" pitchFamily="49" charset="0"/>
-                <a:cs typeface="Courier New" panose="02070309020205020404" pitchFamily="49" charset="0"/>
-              </a:rPr>
-              <a:t>webp</a:t>
-            </a:r>
-            <a:endParaRPr lang="en-US" sz="1200" b="1" dirty="0">
-              <a:latin typeface="Courier New" panose="02070309020205020404" pitchFamily="49" charset="0"/>
-              <a:cs typeface="Courier New" panose="02070309020205020404" pitchFamily="49" charset="0"/>
-            </a:endParaRPr>
-          </a:p>
-          <a:p>
-            <a:pPr marL="0" indent="0">
-              <a:spcBef>
-                <a:spcPts val="0"/>
-              </a:spcBef>
-              <a:buNone/>
-            </a:pPr>
-            <a:r>
-              <a:rPr lang="en-US" sz="1200" b="1" dirty="0">
-                <a:latin typeface="Courier New" panose="02070309020205020404" pitchFamily="49" charset="0"/>
-                <a:cs typeface="Courier New" panose="02070309020205020404" pitchFamily="49" charset="0"/>
-              </a:rPr>
-              <a:t>==&gt; Pouring </a:t>
-            </a:r>
-            <a:r>
-              <a:rPr lang="en-US" sz="1200" b="1" dirty="0" err="1">
-                <a:latin typeface="Courier New" panose="02070309020205020404" pitchFamily="49" charset="0"/>
-                <a:cs typeface="Courier New" panose="02070309020205020404" pitchFamily="49" charset="0"/>
-              </a:rPr>
-              <a:t>webp</a:t>
-            </a:r>
-            <a:r>
-              <a:rPr lang="en-US" sz="1200" b="1" dirty="0">
-                <a:latin typeface="Courier New" panose="02070309020205020404" pitchFamily="49" charset="0"/>
-                <a:cs typeface="Courier New" panose="02070309020205020404" pitchFamily="49" charset="0"/>
-              </a:rPr>
-              <a:t>--1.2.0.mojave.bottle.tar.gz</a:t>
-            </a:r>
-          </a:p>
-          <a:p>
-            <a:pPr marL="0" indent="0">
-              <a:spcBef>
-                <a:spcPts val="0"/>
-              </a:spcBef>
-              <a:buNone/>
-            </a:pPr>
-            <a:r>
-              <a:rPr lang="en-US" sz="1200" b="1" dirty="0">
-                <a:latin typeface="Courier New" panose="02070309020205020404" pitchFamily="49" charset="0"/>
-                <a:cs typeface="Courier New" panose="02070309020205020404" pitchFamily="49" charset="0"/>
-              </a:rPr>
-              <a:t>🍺  /</a:t>
-            </a:r>
-            <a:r>
-              <a:rPr lang="en-US" sz="1200" b="1" dirty="0" err="1">
-                <a:latin typeface="Courier New" panose="02070309020205020404" pitchFamily="49" charset="0"/>
-                <a:cs typeface="Courier New" panose="02070309020205020404" pitchFamily="49" charset="0"/>
-              </a:rPr>
-              <a:t>usr</a:t>
-            </a:r>
-            <a:r>
-              <a:rPr lang="en-US" sz="1200" b="1" dirty="0">
-                <a:latin typeface="Courier New" panose="02070309020205020404" pitchFamily="49" charset="0"/>
-                <a:cs typeface="Courier New" panose="02070309020205020404" pitchFamily="49" charset="0"/>
-              </a:rPr>
-              <a:t>/local/Cellar/</a:t>
-            </a:r>
-            <a:r>
-              <a:rPr lang="en-US" sz="1200" b="1" dirty="0" err="1">
-                <a:latin typeface="Courier New" panose="02070309020205020404" pitchFamily="49" charset="0"/>
-                <a:cs typeface="Courier New" panose="02070309020205020404" pitchFamily="49" charset="0"/>
-              </a:rPr>
-              <a:t>webp</a:t>
-            </a:r>
-            <a:r>
-              <a:rPr lang="en-US" sz="1200" b="1" dirty="0">
-                <a:latin typeface="Courier New" panose="02070309020205020404" pitchFamily="49" charset="0"/>
-                <a:cs typeface="Courier New" panose="02070309020205020404" pitchFamily="49" charset="0"/>
-              </a:rPr>
-              <a:t>/1.2.0: 39 files, 2.1MB</a:t>
-            </a:r>
-          </a:p>
-          <a:p>
-            <a:pPr marL="0" indent="0">
-              <a:spcBef>
-                <a:spcPts val="0"/>
-              </a:spcBef>
-              <a:buNone/>
-            </a:pPr>
-            <a:r>
-              <a:rPr lang="en-US" sz="1200" b="1" dirty="0">
-                <a:latin typeface="Courier New" panose="02070309020205020404" pitchFamily="49" charset="0"/>
-                <a:cs typeface="Courier New" panose="02070309020205020404" pitchFamily="49" charset="0"/>
-              </a:rPr>
-              <a:t>==&gt; Installing </a:t>
-            </a:r>
-            <a:r>
-              <a:rPr lang="en-US" sz="1200" b="1" dirty="0" err="1">
-                <a:latin typeface="Courier New" panose="02070309020205020404" pitchFamily="49" charset="0"/>
-                <a:cs typeface="Courier New" panose="02070309020205020404" pitchFamily="49" charset="0"/>
-              </a:rPr>
-              <a:t>imagemagick</a:t>
-            </a:r>
-            <a:endParaRPr lang="en-US" sz="1200" b="1" dirty="0">
-              <a:latin typeface="Courier New" panose="02070309020205020404" pitchFamily="49" charset="0"/>
-              <a:cs typeface="Courier New" panose="02070309020205020404" pitchFamily="49" charset="0"/>
-            </a:endParaRPr>
-          </a:p>
-          <a:p>
-            <a:pPr marL="0" indent="0">
-              <a:spcBef>
-                <a:spcPts val="0"/>
-              </a:spcBef>
-              <a:buNone/>
-            </a:pPr>
-            <a:r>
-              <a:rPr lang="en-US" sz="1200" b="1" dirty="0">
-                <a:latin typeface="Courier New" panose="02070309020205020404" pitchFamily="49" charset="0"/>
-                <a:cs typeface="Courier New" panose="02070309020205020404" pitchFamily="49" charset="0"/>
-              </a:rPr>
-              <a:t>==&gt; Pouring </a:t>
-            </a:r>
-            <a:r>
-              <a:rPr lang="en-US" sz="1200" b="1" dirty="0" err="1">
-                <a:latin typeface="Courier New" panose="02070309020205020404" pitchFamily="49" charset="0"/>
-                <a:cs typeface="Courier New" panose="02070309020205020404" pitchFamily="49" charset="0"/>
-              </a:rPr>
-              <a:t>imagemagick</a:t>
-            </a:r>
-            <a:r>
-              <a:rPr lang="en-US" sz="1200" b="1" dirty="0">
-                <a:latin typeface="Courier New" panose="02070309020205020404" pitchFamily="49" charset="0"/>
-                <a:cs typeface="Courier New" panose="02070309020205020404" pitchFamily="49" charset="0"/>
-              </a:rPr>
-              <a:t>--7.1.0-2_1.mojave.bottle.tar.gz</a:t>
-            </a:r>
-          </a:p>
-          <a:p>
-            <a:pPr marL="0" indent="0">
-              <a:spcBef>
-                <a:spcPts val="0"/>
-              </a:spcBef>
-              <a:buNone/>
-            </a:pPr>
-            <a:r>
-              <a:rPr lang="en-US" sz="1200" b="1" dirty="0">
-                <a:latin typeface="Courier New" panose="02070309020205020404" pitchFamily="49" charset="0"/>
-                <a:cs typeface="Courier New" panose="02070309020205020404" pitchFamily="49" charset="0"/>
-              </a:rPr>
-              <a:t>🍺  /</a:t>
-            </a:r>
-            <a:r>
-              <a:rPr lang="en-US" sz="1200" b="1" dirty="0" err="1">
-                <a:latin typeface="Courier New" panose="02070309020205020404" pitchFamily="49" charset="0"/>
-                <a:cs typeface="Courier New" panose="02070309020205020404" pitchFamily="49" charset="0"/>
-              </a:rPr>
-              <a:t>usr</a:t>
-            </a:r>
-            <a:r>
-              <a:rPr lang="en-US" sz="1200" b="1" dirty="0">
-                <a:latin typeface="Courier New" panose="02070309020205020404" pitchFamily="49" charset="0"/>
-                <a:cs typeface="Courier New" panose="02070309020205020404" pitchFamily="49" charset="0"/>
-              </a:rPr>
-              <a:t>/local/Cellar/</a:t>
-            </a:r>
-            <a:r>
-              <a:rPr lang="en-US" sz="1200" b="1" dirty="0" err="1">
-                <a:latin typeface="Courier New" panose="02070309020205020404" pitchFamily="49" charset="0"/>
-                <a:cs typeface="Courier New" panose="02070309020205020404" pitchFamily="49" charset="0"/>
-              </a:rPr>
-              <a:t>imagemagick</a:t>
-            </a:r>
-            <a:r>
-              <a:rPr lang="en-US" sz="1200" b="1" dirty="0">
-                <a:latin typeface="Courier New" panose="02070309020205020404" pitchFamily="49" charset="0"/>
-                <a:cs typeface="Courier New" panose="02070309020205020404" pitchFamily="49" charset="0"/>
-              </a:rPr>
-              <a:t>/7.1.0-2_1: 799 files, 25MB</a:t>
-            </a:r>
-          </a:p>
-          <a:p>
-            <a:pPr marL="0" indent="0">
-              <a:spcBef>
-                <a:spcPts val="0"/>
-              </a:spcBef>
-              <a:buNone/>
-            </a:pPr>
-            <a:endParaRPr lang="en-US" sz="1200" b="1" dirty="0">
-              <a:latin typeface="Courier New" panose="02070309020205020404" pitchFamily="49" charset="0"/>
-              <a:cs typeface="Courier New" panose="02070309020205020404" pitchFamily="49" charset="0"/>
-            </a:endParaRPr>
-          </a:p>
-          <a:p>
-            <a:pPr marL="0" indent="0">
-              <a:spcBef>
-                <a:spcPts val="0"/>
-              </a:spcBef>
-              <a:buNone/>
-            </a:pPr>
-            <a:endParaRPr lang="en-US" sz="1200" b="1" dirty="0">
-              <a:latin typeface="Courier New" panose="02070309020205020404" pitchFamily="49" charset="0"/>
-              <a:cs typeface="Courier New" panose="02070309020205020404" pitchFamily="49" charset="0"/>
-            </a:endParaRPr>
-          </a:p>
-          <a:p>
-            <a:pPr marL="0" indent="0">
-              <a:spcBef>
-                <a:spcPts val="0"/>
-              </a:spcBef>
-              <a:buNone/>
-            </a:pPr>
-            <a:r>
-              <a:rPr lang="en-US" sz="1200" dirty="0">
-                <a:cs typeface="Courier New" panose="02070309020205020404" pitchFamily="49" charset="0"/>
-              </a:rPr>
-              <a:t>You should then have access to various </a:t>
-            </a:r>
-            <a:r>
-              <a:rPr lang="en-US" sz="1200" dirty="0" err="1">
-                <a:cs typeface="Courier New" panose="02070309020205020404" pitchFamily="49" charset="0"/>
-              </a:rPr>
+            <a:r>
+              <a:rPr lang="en-US" sz="1400" dirty="0">
+                <a:solidFill>
+                  <a:schemeClr val="tx1">
+                    <a:alpha val="20000"/>
+                  </a:schemeClr>
+                </a:solidFill>
+              </a:rPr>
+              <a:t>Apple Intel CPU vs. Silicon (M1) CPU</a:t>
+            </a:r>
+          </a:p>
+          <a:p>
+            <a:pPr lvl="2"/>
+            <a:r>
+              <a:rPr lang="en-US" sz="1400" dirty="0">
+                <a:solidFill>
+                  <a:schemeClr val="tx1">
+                    <a:alpha val="20000"/>
+                  </a:schemeClr>
+                </a:solidFill>
+              </a:rPr>
+              <a:t> You may experience some problems with our setup instructions if you have the newer Apple Silicon CPU. If so, please contact us (see Support page at end).</a:t>
+            </a:r>
+          </a:p>
+          <a:p>
+            <a:r>
+              <a:rPr lang="en-US" sz="1400" dirty="0">
+                <a:solidFill>
+                  <a:schemeClr val="tx1">
+                    <a:alpha val="20000"/>
+                  </a:schemeClr>
+                </a:solidFill>
+              </a:rPr>
+              <a:t>OpenMP-enabled g++ (using Homebrew)</a:t>
+            </a:r>
+          </a:p>
+          <a:p>
+            <a:r>
+              <a:rPr lang="en-US" sz="1400" dirty="0">
+                <a:solidFill>
+                  <a:schemeClr val="tx1">
+                    <a:alpha val="20000"/>
+                  </a:schemeClr>
+                </a:solidFill>
+              </a:rPr>
+              <a:t>Test building the default model (“heterogeneity”)</a:t>
+            </a:r>
+          </a:p>
+          <a:p>
+            <a:r>
+              <a:rPr lang="en-US" sz="1400" dirty="0">
+                <a:solidFill>
+                  <a:schemeClr val="tx1">
+                    <a:alpha val="20000"/>
+                  </a:schemeClr>
+                </a:solidFill>
+              </a:rPr>
+              <a:t>Python 3 (using Anaconda distribution)</a:t>
+            </a:r>
+          </a:p>
+          <a:p>
+            <a:r>
+              <a:rPr lang="en-US" sz="1400" dirty="0">
+                <a:solidFill>
+                  <a:schemeClr val="tx1">
+                    <a:alpha val="20000"/>
+                  </a:schemeClr>
+                </a:solidFill>
+              </a:rPr>
+              <a:t>Test building an intracellular model</a:t>
+            </a:r>
+          </a:p>
+          <a:p>
+            <a:r>
+              <a:rPr lang="en-US" sz="1400" dirty="0" err="1"/>
               <a:t>ImageMagick</a:t>
             </a:r>
-            <a:r>
-              <a:rPr lang="en-US" sz="1200" dirty="0">
-                <a:cs typeface="Courier New" panose="02070309020205020404" pitchFamily="49" charset="0"/>
-              </a:rPr>
-              <a:t> commands, for example:</a:t>
-            </a:r>
-          </a:p>
-          <a:p>
-            <a:pPr marL="0" indent="0">
-              <a:spcBef>
-                <a:spcPts val="0"/>
-              </a:spcBef>
-              <a:buNone/>
-            </a:pPr>
-            <a:r>
-              <a:rPr lang="en-US" sz="1200" b="1" dirty="0">
-                <a:latin typeface="Courier New" panose="02070309020205020404" pitchFamily="49" charset="0"/>
-                <a:cs typeface="Courier New" panose="02070309020205020404" pitchFamily="49" charset="0"/>
-              </a:rPr>
-              <a:t>$ which convert</a:t>
-            </a:r>
-          </a:p>
-          <a:p>
-            <a:pPr marL="0" indent="0">
-              <a:spcBef>
-                <a:spcPts val="0"/>
-              </a:spcBef>
-              <a:buNone/>
-            </a:pPr>
-            <a:r>
-              <a:rPr lang="en-US" sz="1200" b="1" dirty="0">
-                <a:latin typeface="Courier New" panose="02070309020205020404" pitchFamily="49" charset="0"/>
-                <a:cs typeface="Courier New" panose="02070309020205020404" pitchFamily="49" charset="0"/>
-              </a:rPr>
-              <a:t>/</a:t>
-            </a:r>
-            <a:r>
-              <a:rPr lang="en-US" sz="1200" b="1" dirty="0" err="1">
-                <a:latin typeface="Courier New" panose="02070309020205020404" pitchFamily="49" charset="0"/>
-                <a:cs typeface="Courier New" panose="02070309020205020404" pitchFamily="49" charset="0"/>
-              </a:rPr>
-              <a:t>usr</a:t>
-            </a:r>
-            <a:r>
-              <a:rPr lang="en-US" sz="1200" b="1" dirty="0">
-                <a:latin typeface="Courier New" panose="02070309020205020404" pitchFamily="49" charset="0"/>
-                <a:cs typeface="Courier New" panose="02070309020205020404" pitchFamily="49" charset="0"/>
-              </a:rPr>
-              <a:t>/local/bin/convert</a:t>
-            </a:r>
-          </a:p>
-          <a:p>
-            <a:pPr marL="0" indent="0">
-              <a:spcBef>
-                <a:spcPts val="0"/>
-              </a:spcBef>
-              <a:buNone/>
-            </a:pPr>
-            <a:endParaRPr lang="en-US" sz="1200" b="1" dirty="0">
-              <a:latin typeface="Courier New" panose="02070309020205020404" pitchFamily="49" charset="0"/>
-              <a:cs typeface="Courier New" panose="02070309020205020404" pitchFamily="49" charset="0"/>
-            </a:endParaRPr>
-          </a:p>
-        </p:txBody>
-      </p:sp>
-      <p:sp>
-        <p:nvSpPr>
-          <p:cNvPr id="4" name="TextBox 3">
-            <a:extLst>
-              <a:ext uri="{FF2B5EF4-FFF2-40B4-BE49-F238E27FC236}">
-                <a16:creationId xmlns:a16="http://schemas.microsoft.com/office/drawing/2014/main" id="{CF4180CB-0FF2-8843-BF1C-EA1F88CD6950}"/>
-              </a:ext>
-            </a:extLst>
-          </p:cNvPr>
-          <p:cNvSpPr txBox="1"/>
-          <p:nvPr/>
-        </p:nvSpPr>
-        <p:spPr>
-          <a:xfrm>
-            <a:off x="4847208" y="1455937"/>
-            <a:ext cx="4296793" cy="184666"/>
-          </a:xfrm>
-          <a:prstGeom prst="rect">
-            <a:avLst/>
-          </a:prstGeom>
-          <a:noFill/>
-        </p:spPr>
-        <p:txBody>
-          <a:bodyPr wrap="square" lIns="0" tIns="0" rIns="0" bIns="0" rtlCol="0">
-            <a:spAutoFit/>
-          </a:bodyPr>
-          <a:lstStyle/>
-          <a:p>
-            <a:r>
-              <a:rPr lang="en-US" sz="1200" dirty="0"/>
-              <a:t>(optionally, </a:t>
-            </a:r>
-            <a:r>
-              <a:rPr lang="en-US" sz="1200" b="1" dirty="0">
-                <a:highlight>
-                  <a:srgbClr val="FFFF00"/>
-                </a:highlight>
-                <a:latin typeface="Courier New" panose="02070309020205020404" pitchFamily="49" charset="0"/>
-                <a:cs typeface="Courier New" panose="02070309020205020404" pitchFamily="49" charset="0"/>
-              </a:rPr>
-              <a:t>brew install </a:t>
-            </a:r>
-            <a:r>
-              <a:rPr lang="en-US" sz="1200" b="1" dirty="0" err="1">
-                <a:highlight>
-                  <a:srgbClr val="FFFF00"/>
-                </a:highlight>
-                <a:latin typeface="Courier New" panose="02070309020205020404" pitchFamily="49" charset="0"/>
-                <a:cs typeface="Courier New" panose="02070309020205020404" pitchFamily="49" charset="0"/>
-              </a:rPr>
-              <a:t>imagemagick</a:t>
-            </a:r>
-            <a:r>
-              <a:rPr lang="en-US" sz="1200" b="1" dirty="0">
-                <a:highlight>
-                  <a:srgbClr val="FFFF00"/>
-                </a:highlight>
-                <a:latin typeface="Courier New" panose="02070309020205020404" pitchFamily="49" charset="0"/>
-                <a:cs typeface="Courier New" panose="02070309020205020404" pitchFamily="49" charset="0"/>
-              </a:rPr>
-              <a:t> --with-x11</a:t>
-            </a:r>
-            <a:r>
-              <a:rPr lang="en-US" sz="1200" dirty="0"/>
-              <a:t>)</a:t>
+            <a:endParaRPr lang="en-US" sz="1400" dirty="0"/>
+          </a:p>
+          <a:p>
+            <a:r>
+              <a:rPr lang="en-US" sz="1400" dirty="0">
+                <a:solidFill>
+                  <a:schemeClr val="tx1">
+                    <a:alpha val="20000"/>
+                  </a:schemeClr>
+                </a:solidFill>
+              </a:rPr>
+              <a:t>PhysiCell Model Builder</a:t>
             </a:r>
           </a:p>
         </p:txBody>
@@ -11499,7 +11494,7 @@
     </p:spTree>
     <p:extLst>
       <p:ext uri="{BB962C8B-B14F-4D97-AF65-F5344CB8AC3E}">
-        <p14:creationId xmlns:p14="http://schemas.microsoft.com/office/powerpoint/2010/main" val="2631756468"/>
+        <p14:creationId xmlns:p14="http://schemas.microsoft.com/office/powerpoint/2010/main" val="2032267813"/>
       </p:ext>
     </p:extLst>
   </p:cSld>
@@ -11894,6 +11889,1715 @@
           <p:cNvPr id="2" name="Title 1">
             <a:extLst>
               <a:ext uri="{FF2B5EF4-FFF2-40B4-BE49-F238E27FC236}">
+                <a16:creationId xmlns:a16="http://schemas.microsoft.com/office/drawing/2014/main" id="{6A279D37-B62F-714B-89C4-F3C8392D29DC}"/>
+              </a:ext>
+            </a:extLst>
+          </p:cNvPr>
+          <p:cNvSpPr>
+            <a:spLocks noGrp="1"/>
+          </p:cNvSpPr>
+          <p:nvPr>
+            <p:ph type="title"/>
+          </p:nvPr>
+        </p:nvSpPr>
+        <p:spPr/>
+        <p:txBody>
+          <a:bodyPr/>
+          <a:lstStyle/>
+          <a:p>
+            <a:r>
+              <a:rPr lang="en-US" dirty="0" err="1"/>
+              <a:t>ImageMagick</a:t>
+            </a:r>
+            <a:r>
+              <a:rPr lang="en-US" dirty="0"/>
+              <a:t> (1)</a:t>
+            </a:r>
+          </a:p>
+        </p:txBody>
+      </p:sp>
+      <p:sp>
+        <p:nvSpPr>
+          <p:cNvPr id="3" name="Content Placeholder 2">
+            <a:extLst>
+              <a:ext uri="{FF2B5EF4-FFF2-40B4-BE49-F238E27FC236}">
+                <a16:creationId xmlns:a16="http://schemas.microsoft.com/office/drawing/2014/main" id="{EF8FE15D-1FA9-C442-A734-A76FCD711FFD}"/>
+              </a:ext>
+            </a:extLst>
+          </p:cNvPr>
+          <p:cNvSpPr>
+            <a:spLocks noGrp="1"/>
+          </p:cNvSpPr>
+          <p:nvPr>
+            <p:ph idx="1"/>
+          </p:nvPr>
+        </p:nvSpPr>
+        <p:spPr/>
+        <p:txBody>
+          <a:bodyPr>
+            <a:normAutofit/>
+          </a:bodyPr>
+          <a:lstStyle/>
+          <a:p>
+            <a:pPr marL="0" indent="0">
+              <a:spcBef>
+                <a:spcPts val="0"/>
+              </a:spcBef>
+              <a:buNone/>
+            </a:pPr>
+            <a:r>
+              <a:rPr lang="en-US" sz="1200" dirty="0">
+                <a:cs typeface="Courier New" panose="02070309020205020404" pitchFamily="49" charset="0"/>
+                <a:hlinkClick r:id="rId2"/>
+              </a:rPr>
+              <a:t>https://imagemagick.org/</a:t>
+            </a:r>
+            <a:r>
+              <a:rPr lang="en-US" sz="1200" dirty="0">
+                <a:cs typeface="Courier New" panose="02070309020205020404" pitchFamily="49" charset="0"/>
+              </a:rPr>
+              <a:t> - free, powerful image conversion, composition, editing software.</a:t>
+            </a:r>
+          </a:p>
+          <a:p>
+            <a:pPr marL="0" indent="0">
+              <a:spcBef>
+                <a:spcPts val="0"/>
+              </a:spcBef>
+              <a:buNone/>
+            </a:pPr>
+            <a:endParaRPr lang="en-US" sz="1200" b="1" dirty="0">
+              <a:latin typeface="Courier New" panose="02070309020205020404" pitchFamily="49" charset="0"/>
+              <a:cs typeface="Courier New" panose="02070309020205020404" pitchFamily="49" charset="0"/>
+            </a:endParaRPr>
+          </a:p>
+          <a:p>
+            <a:pPr marL="0" indent="0">
+              <a:spcBef>
+                <a:spcPts val="0"/>
+              </a:spcBef>
+              <a:buNone/>
+            </a:pPr>
+            <a:r>
+              <a:rPr lang="en-US" sz="1200" dirty="0">
+                <a:cs typeface="Courier New" panose="02070309020205020404" pitchFamily="49" charset="0"/>
+              </a:rPr>
+              <a:t>$ </a:t>
+            </a:r>
+            <a:r>
+              <a:rPr lang="en-US" sz="1200" b="1" dirty="0">
+                <a:highlight>
+                  <a:srgbClr val="FFFF00"/>
+                </a:highlight>
+                <a:latin typeface="Courier New" panose="02070309020205020404" pitchFamily="49" charset="0"/>
+                <a:cs typeface="Courier New" panose="02070309020205020404" pitchFamily="49" charset="0"/>
+              </a:rPr>
+              <a:t>brew install </a:t>
+            </a:r>
+            <a:r>
+              <a:rPr lang="en-US" sz="1200" b="1" dirty="0" err="1">
+                <a:highlight>
+                  <a:srgbClr val="FFFF00"/>
+                </a:highlight>
+                <a:latin typeface="Courier New" panose="02070309020205020404" pitchFamily="49" charset="0"/>
+                <a:cs typeface="Courier New" panose="02070309020205020404" pitchFamily="49" charset="0"/>
+              </a:rPr>
+              <a:t>imagemagick</a:t>
+            </a:r>
+            <a:endParaRPr lang="en-US" sz="1200" b="1" dirty="0">
+              <a:highlight>
+                <a:srgbClr val="FFFF00"/>
+              </a:highlight>
+              <a:latin typeface="Courier New" panose="02070309020205020404" pitchFamily="49" charset="0"/>
+              <a:cs typeface="Courier New" panose="02070309020205020404" pitchFamily="49" charset="0"/>
+            </a:endParaRPr>
+          </a:p>
+          <a:p>
+            <a:pPr marL="0" indent="0">
+              <a:spcBef>
+                <a:spcPts val="0"/>
+              </a:spcBef>
+              <a:buNone/>
+            </a:pPr>
+            <a:endParaRPr lang="en-US" sz="1200" b="1" dirty="0">
+              <a:highlight>
+                <a:srgbClr val="FFFF00"/>
+              </a:highlight>
+              <a:latin typeface="Courier New" panose="02070309020205020404" pitchFamily="49" charset="0"/>
+              <a:cs typeface="Courier New" panose="02070309020205020404" pitchFamily="49" charset="0"/>
+            </a:endParaRPr>
+          </a:p>
+          <a:p>
+            <a:pPr marL="0" indent="0">
+              <a:spcBef>
+                <a:spcPts val="0"/>
+              </a:spcBef>
+              <a:buNone/>
+            </a:pPr>
+            <a:r>
+              <a:rPr lang="en-US" sz="1200" dirty="0">
+                <a:cs typeface="Courier New" panose="02070309020205020404" pitchFamily="49" charset="0"/>
+              </a:rPr>
+              <a:t>     (probably will install lots of dependencies)</a:t>
+            </a:r>
+          </a:p>
+          <a:p>
+            <a:pPr marL="0" indent="0">
+              <a:spcBef>
+                <a:spcPts val="0"/>
+              </a:spcBef>
+              <a:buNone/>
+            </a:pPr>
+            <a:r>
+              <a:rPr lang="en-US" sz="1200" dirty="0">
+                <a:cs typeface="Courier New" panose="02070309020205020404" pitchFamily="49" charset="0"/>
+              </a:rPr>
+              <a:t>...</a:t>
+            </a:r>
+          </a:p>
+          <a:p>
+            <a:pPr marL="0" indent="0">
+              <a:spcBef>
+                <a:spcPts val="0"/>
+              </a:spcBef>
+              <a:buNone/>
+            </a:pPr>
+            <a:r>
+              <a:rPr lang="en-US" sz="1200" b="1" dirty="0">
+                <a:latin typeface="Courier New" panose="02070309020205020404" pitchFamily="49" charset="0"/>
+                <a:cs typeface="Courier New" panose="02070309020205020404" pitchFamily="49" charset="0"/>
+              </a:rPr>
+              <a:t>==&gt; Installing </a:t>
+            </a:r>
+            <a:r>
+              <a:rPr lang="en-US" sz="1200" b="1" dirty="0" err="1">
+                <a:latin typeface="Courier New" panose="02070309020205020404" pitchFamily="49" charset="0"/>
+                <a:cs typeface="Courier New" panose="02070309020205020404" pitchFamily="49" charset="0"/>
+              </a:rPr>
+              <a:t>imagemagick</a:t>
+            </a:r>
+            <a:r>
+              <a:rPr lang="en-US" sz="1200" b="1" dirty="0">
+                <a:latin typeface="Courier New" panose="02070309020205020404" pitchFamily="49" charset="0"/>
+                <a:cs typeface="Courier New" panose="02070309020205020404" pitchFamily="49" charset="0"/>
+              </a:rPr>
+              <a:t> dependency: </a:t>
+            </a:r>
+            <a:r>
+              <a:rPr lang="en-US" sz="1200" b="1" dirty="0" err="1">
+                <a:latin typeface="Courier New" panose="02070309020205020404" pitchFamily="49" charset="0"/>
+                <a:cs typeface="Courier New" panose="02070309020205020404" pitchFamily="49" charset="0"/>
+              </a:rPr>
+              <a:t>openexr</a:t>
+            </a:r>
+            <a:endParaRPr lang="en-US" sz="1200" b="1" dirty="0">
+              <a:latin typeface="Courier New" panose="02070309020205020404" pitchFamily="49" charset="0"/>
+              <a:cs typeface="Courier New" panose="02070309020205020404" pitchFamily="49" charset="0"/>
+            </a:endParaRPr>
+          </a:p>
+          <a:p>
+            <a:pPr marL="0" indent="0">
+              <a:spcBef>
+                <a:spcPts val="0"/>
+              </a:spcBef>
+              <a:buNone/>
+            </a:pPr>
+            <a:r>
+              <a:rPr lang="en-US" sz="1200" b="1" dirty="0">
+                <a:latin typeface="Courier New" panose="02070309020205020404" pitchFamily="49" charset="0"/>
+                <a:cs typeface="Courier New" panose="02070309020205020404" pitchFamily="49" charset="0"/>
+              </a:rPr>
+              <a:t>==&gt; Pouring </a:t>
+            </a:r>
+            <a:r>
+              <a:rPr lang="en-US" sz="1200" b="1" dirty="0" err="1">
+                <a:latin typeface="Courier New" panose="02070309020205020404" pitchFamily="49" charset="0"/>
+                <a:cs typeface="Courier New" panose="02070309020205020404" pitchFamily="49" charset="0"/>
+              </a:rPr>
+              <a:t>openexr</a:t>
+            </a:r>
+            <a:r>
+              <a:rPr lang="en-US" sz="1200" b="1" dirty="0">
+                <a:latin typeface="Courier New" panose="02070309020205020404" pitchFamily="49" charset="0"/>
+                <a:cs typeface="Courier New" panose="02070309020205020404" pitchFamily="49" charset="0"/>
+              </a:rPr>
+              <a:t>--3.0.5.mojave.bottle.tar.gz</a:t>
+            </a:r>
+          </a:p>
+          <a:p>
+            <a:pPr marL="0" indent="0">
+              <a:spcBef>
+                <a:spcPts val="0"/>
+              </a:spcBef>
+              <a:buNone/>
+            </a:pPr>
+            <a:r>
+              <a:rPr lang="en-US" sz="1200" b="1" dirty="0">
+                <a:latin typeface="Courier New" panose="02070309020205020404" pitchFamily="49" charset="0"/>
+                <a:cs typeface="Courier New" panose="02070309020205020404" pitchFamily="49" charset="0"/>
+              </a:rPr>
+              <a:t>🍺  /</a:t>
+            </a:r>
+            <a:r>
+              <a:rPr lang="en-US" sz="1200" b="1" dirty="0" err="1">
+                <a:latin typeface="Courier New" panose="02070309020205020404" pitchFamily="49" charset="0"/>
+                <a:cs typeface="Courier New" panose="02070309020205020404" pitchFamily="49" charset="0"/>
+              </a:rPr>
+              <a:t>usr</a:t>
+            </a:r>
+            <a:r>
+              <a:rPr lang="en-US" sz="1200" b="1" dirty="0">
+                <a:latin typeface="Courier New" panose="02070309020205020404" pitchFamily="49" charset="0"/>
+                <a:cs typeface="Courier New" panose="02070309020205020404" pitchFamily="49" charset="0"/>
+              </a:rPr>
+              <a:t>/local/Cellar/</a:t>
+            </a:r>
+            <a:r>
+              <a:rPr lang="en-US" sz="1200" b="1" dirty="0" err="1">
+                <a:latin typeface="Courier New" panose="02070309020205020404" pitchFamily="49" charset="0"/>
+                <a:cs typeface="Courier New" panose="02070309020205020404" pitchFamily="49" charset="0"/>
+              </a:rPr>
+              <a:t>openexr</a:t>
+            </a:r>
+            <a:r>
+              <a:rPr lang="en-US" sz="1200" b="1" dirty="0">
+                <a:latin typeface="Courier New" panose="02070309020205020404" pitchFamily="49" charset="0"/>
+                <a:cs typeface="Courier New" panose="02070309020205020404" pitchFamily="49" charset="0"/>
+              </a:rPr>
+              <a:t>/3.0.5: 176 files, 5.0MB</a:t>
+            </a:r>
+          </a:p>
+          <a:p>
+            <a:pPr marL="0" indent="0">
+              <a:spcBef>
+                <a:spcPts val="0"/>
+              </a:spcBef>
+              <a:buNone/>
+            </a:pPr>
+            <a:r>
+              <a:rPr lang="en-US" sz="1200" b="1" dirty="0">
+                <a:latin typeface="Courier New" panose="02070309020205020404" pitchFamily="49" charset="0"/>
+                <a:cs typeface="Courier New" panose="02070309020205020404" pitchFamily="49" charset="0"/>
+              </a:rPr>
+              <a:t>==&gt; Installing </a:t>
+            </a:r>
+            <a:r>
+              <a:rPr lang="en-US" sz="1200" b="1" dirty="0" err="1">
+                <a:latin typeface="Courier New" panose="02070309020205020404" pitchFamily="49" charset="0"/>
+                <a:cs typeface="Courier New" panose="02070309020205020404" pitchFamily="49" charset="0"/>
+              </a:rPr>
+              <a:t>imagemagick</a:t>
+            </a:r>
+            <a:r>
+              <a:rPr lang="en-US" sz="1200" b="1" dirty="0">
+                <a:latin typeface="Courier New" panose="02070309020205020404" pitchFamily="49" charset="0"/>
+                <a:cs typeface="Courier New" panose="02070309020205020404" pitchFamily="49" charset="0"/>
+              </a:rPr>
+              <a:t> dependency: </a:t>
+            </a:r>
+            <a:r>
+              <a:rPr lang="en-US" sz="1200" b="1" dirty="0" err="1">
+                <a:latin typeface="Courier New" panose="02070309020205020404" pitchFamily="49" charset="0"/>
+                <a:cs typeface="Courier New" panose="02070309020205020404" pitchFamily="49" charset="0"/>
+              </a:rPr>
+              <a:t>webp</a:t>
+            </a:r>
+            <a:endParaRPr lang="en-US" sz="1200" b="1" dirty="0">
+              <a:latin typeface="Courier New" panose="02070309020205020404" pitchFamily="49" charset="0"/>
+              <a:cs typeface="Courier New" panose="02070309020205020404" pitchFamily="49" charset="0"/>
+            </a:endParaRPr>
+          </a:p>
+          <a:p>
+            <a:pPr marL="0" indent="0">
+              <a:spcBef>
+                <a:spcPts val="0"/>
+              </a:spcBef>
+              <a:buNone/>
+            </a:pPr>
+            <a:r>
+              <a:rPr lang="en-US" sz="1200" b="1" dirty="0">
+                <a:latin typeface="Courier New" panose="02070309020205020404" pitchFamily="49" charset="0"/>
+                <a:cs typeface="Courier New" panose="02070309020205020404" pitchFamily="49" charset="0"/>
+              </a:rPr>
+              <a:t>==&gt; Pouring </a:t>
+            </a:r>
+            <a:r>
+              <a:rPr lang="en-US" sz="1200" b="1" dirty="0" err="1">
+                <a:latin typeface="Courier New" panose="02070309020205020404" pitchFamily="49" charset="0"/>
+                <a:cs typeface="Courier New" panose="02070309020205020404" pitchFamily="49" charset="0"/>
+              </a:rPr>
+              <a:t>webp</a:t>
+            </a:r>
+            <a:r>
+              <a:rPr lang="en-US" sz="1200" b="1" dirty="0">
+                <a:latin typeface="Courier New" panose="02070309020205020404" pitchFamily="49" charset="0"/>
+                <a:cs typeface="Courier New" panose="02070309020205020404" pitchFamily="49" charset="0"/>
+              </a:rPr>
+              <a:t>--1.2.0.mojave.bottle.tar.gz</a:t>
+            </a:r>
+          </a:p>
+          <a:p>
+            <a:pPr marL="0" indent="0">
+              <a:spcBef>
+                <a:spcPts val="0"/>
+              </a:spcBef>
+              <a:buNone/>
+            </a:pPr>
+            <a:r>
+              <a:rPr lang="en-US" sz="1200" b="1" dirty="0">
+                <a:latin typeface="Courier New" panose="02070309020205020404" pitchFamily="49" charset="0"/>
+                <a:cs typeface="Courier New" panose="02070309020205020404" pitchFamily="49" charset="0"/>
+              </a:rPr>
+              <a:t>🍺  /</a:t>
+            </a:r>
+            <a:r>
+              <a:rPr lang="en-US" sz="1200" b="1" dirty="0" err="1">
+                <a:latin typeface="Courier New" panose="02070309020205020404" pitchFamily="49" charset="0"/>
+                <a:cs typeface="Courier New" panose="02070309020205020404" pitchFamily="49" charset="0"/>
+              </a:rPr>
+              <a:t>usr</a:t>
+            </a:r>
+            <a:r>
+              <a:rPr lang="en-US" sz="1200" b="1" dirty="0">
+                <a:latin typeface="Courier New" panose="02070309020205020404" pitchFamily="49" charset="0"/>
+                <a:cs typeface="Courier New" panose="02070309020205020404" pitchFamily="49" charset="0"/>
+              </a:rPr>
+              <a:t>/local/Cellar/</a:t>
+            </a:r>
+            <a:r>
+              <a:rPr lang="en-US" sz="1200" b="1" dirty="0" err="1">
+                <a:latin typeface="Courier New" panose="02070309020205020404" pitchFamily="49" charset="0"/>
+                <a:cs typeface="Courier New" panose="02070309020205020404" pitchFamily="49" charset="0"/>
+              </a:rPr>
+              <a:t>webp</a:t>
+            </a:r>
+            <a:r>
+              <a:rPr lang="en-US" sz="1200" b="1" dirty="0">
+                <a:latin typeface="Courier New" panose="02070309020205020404" pitchFamily="49" charset="0"/>
+                <a:cs typeface="Courier New" panose="02070309020205020404" pitchFamily="49" charset="0"/>
+              </a:rPr>
+              <a:t>/1.2.0: 39 files, 2.1MB</a:t>
+            </a:r>
+          </a:p>
+          <a:p>
+            <a:pPr marL="0" indent="0">
+              <a:spcBef>
+                <a:spcPts val="0"/>
+              </a:spcBef>
+              <a:buNone/>
+            </a:pPr>
+            <a:r>
+              <a:rPr lang="en-US" sz="1200" b="1" dirty="0">
+                <a:latin typeface="Courier New" panose="02070309020205020404" pitchFamily="49" charset="0"/>
+                <a:cs typeface="Courier New" panose="02070309020205020404" pitchFamily="49" charset="0"/>
+              </a:rPr>
+              <a:t>==&gt; Installing </a:t>
+            </a:r>
+            <a:r>
+              <a:rPr lang="en-US" sz="1200" b="1" dirty="0" err="1">
+                <a:latin typeface="Courier New" panose="02070309020205020404" pitchFamily="49" charset="0"/>
+                <a:cs typeface="Courier New" panose="02070309020205020404" pitchFamily="49" charset="0"/>
+              </a:rPr>
+              <a:t>imagemagick</a:t>
+            </a:r>
+            <a:endParaRPr lang="en-US" sz="1200" b="1" dirty="0">
+              <a:latin typeface="Courier New" panose="02070309020205020404" pitchFamily="49" charset="0"/>
+              <a:cs typeface="Courier New" panose="02070309020205020404" pitchFamily="49" charset="0"/>
+            </a:endParaRPr>
+          </a:p>
+          <a:p>
+            <a:pPr marL="0" indent="0">
+              <a:spcBef>
+                <a:spcPts val="0"/>
+              </a:spcBef>
+              <a:buNone/>
+            </a:pPr>
+            <a:r>
+              <a:rPr lang="en-US" sz="1200" b="1" dirty="0">
+                <a:latin typeface="Courier New" panose="02070309020205020404" pitchFamily="49" charset="0"/>
+                <a:cs typeface="Courier New" panose="02070309020205020404" pitchFamily="49" charset="0"/>
+              </a:rPr>
+              <a:t>==&gt; Pouring </a:t>
+            </a:r>
+            <a:r>
+              <a:rPr lang="en-US" sz="1200" b="1" dirty="0" err="1">
+                <a:latin typeface="Courier New" panose="02070309020205020404" pitchFamily="49" charset="0"/>
+                <a:cs typeface="Courier New" panose="02070309020205020404" pitchFamily="49" charset="0"/>
+              </a:rPr>
+              <a:t>imagemagick</a:t>
+            </a:r>
+            <a:r>
+              <a:rPr lang="en-US" sz="1200" b="1" dirty="0">
+                <a:latin typeface="Courier New" panose="02070309020205020404" pitchFamily="49" charset="0"/>
+                <a:cs typeface="Courier New" panose="02070309020205020404" pitchFamily="49" charset="0"/>
+              </a:rPr>
+              <a:t>--7.1.0-2_1.mojave.bottle.tar.gz</a:t>
+            </a:r>
+          </a:p>
+          <a:p>
+            <a:pPr marL="0" indent="0">
+              <a:spcBef>
+                <a:spcPts val="0"/>
+              </a:spcBef>
+              <a:buNone/>
+            </a:pPr>
+            <a:r>
+              <a:rPr lang="en-US" sz="1200" b="1" dirty="0">
+                <a:latin typeface="Courier New" panose="02070309020205020404" pitchFamily="49" charset="0"/>
+                <a:cs typeface="Courier New" panose="02070309020205020404" pitchFamily="49" charset="0"/>
+              </a:rPr>
+              <a:t>🍺  /</a:t>
+            </a:r>
+            <a:r>
+              <a:rPr lang="en-US" sz="1200" b="1" dirty="0" err="1">
+                <a:latin typeface="Courier New" panose="02070309020205020404" pitchFamily="49" charset="0"/>
+                <a:cs typeface="Courier New" panose="02070309020205020404" pitchFamily="49" charset="0"/>
+              </a:rPr>
+              <a:t>usr</a:t>
+            </a:r>
+            <a:r>
+              <a:rPr lang="en-US" sz="1200" b="1" dirty="0">
+                <a:latin typeface="Courier New" panose="02070309020205020404" pitchFamily="49" charset="0"/>
+                <a:cs typeface="Courier New" panose="02070309020205020404" pitchFamily="49" charset="0"/>
+              </a:rPr>
+              <a:t>/local/Cellar/</a:t>
+            </a:r>
+            <a:r>
+              <a:rPr lang="en-US" sz="1200" b="1" dirty="0" err="1">
+                <a:latin typeface="Courier New" panose="02070309020205020404" pitchFamily="49" charset="0"/>
+                <a:cs typeface="Courier New" panose="02070309020205020404" pitchFamily="49" charset="0"/>
+              </a:rPr>
+              <a:t>imagemagick</a:t>
+            </a:r>
+            <a:r>
+              <a:rPr lang="en-US" sz="1200" b="1" dirty="0">
+                <a:latin typeface="Courier New" panose="02070309020205020404" pitchFamily="49" charset="0"/>
+                <a:cs typeface="Courier New" panose="02070309020205020404" pitchFamily="49" charset="0"/>
+              </a:rPr>
+              <a:t>/7.1.0-2_1: 799 files, 25MB</a:t>
+            </a:r>
+          </a:p>
+          <a:p>
+            <a:pPr marL="0" indent="0">
+              <a:spcBef>
+                <a:spcPts val="0"/>
+              </a:spcBef>
+              <a:buNone/>
+            </a:pPr>
+            <a:endParaRPr lang="en-US" sz="1200" b="1" dirty="0">
+              <a:latin typeface="Courier New" panose="02070309020205020404" pitchFamily="49" charset="0"/>
+              <a:cs typeface="Courier New" panose="02070309020205020404" pitchFamily="49" charset="0"/>
+            </a:endParaRPr>
+          </a:p>
+          <a:p>
+            <a:pPr marL="0" indent="0">
+              <a:spcBef>
+                <a:spcPts val="0"/>
+              </a:spcBef>
+              <a:buNone/>
+            </a:pPr>
+            <a:r>
+              <a:rPr lang="en-US" sz="1200" dirty="0">
+                <a:cs typeface="Courier New" panose="02070309020205020404" pitchFamily="49" charset="0"/>
+              </a:rPr>
+              <a:t>You should then have access to various </a:t>
+            </a:r>
+            <a:r>
+              <a:rPr lang="en-US" sz="1200" dirty="0" err="1">
+                <a:cs typeface="Courier New" panose="02070309020205020404" pitchFamily="49" charset="0"/>
+              </a:rPr>
+              <a:t>ImageMagick</a:t>
+            </a:r>
+            <a:r>
+              <a:rPr lang="en-US" sz="1200" dirty="0">
+                <a:cs typeface="Courier New" panose="02070309020205020404" pitchFamily="49" charset="0"/>
+              </a:rPr>
+              <a:t> commands, for example:</a:t>
+            </a:r>
+          </a:p>
+          <a:p>
+            <a:pPr marL="0" indent="0">
+              <a:spcBef>
+                <a:spcPts val="0"/>
+              </a:spcBef>
+              <a:buNone/>
+            </a:pPr>
+            <a:r>
+              <a:rPr lang="en-US" sz="1200" dirty="0">
+                <a:cs typeface="Courier New" panose="02070309020205020404" pitchFamily="49" charset="0"/>
+              </a:rPr>
+              <a:t>$ </a:t>
+            </a:r>
+            <a:r>
+              <a:rPr lang="en-US" sz="1200" b="1" dirty="0">
+                <a:latin typeface="Courier New" panose="02070309020205020404" pitchFamily="49" charset="0"/>
+                <a:cs typeface="Courier New" panose="02070309020205020404" pitchFamily="49" charset="0"/>
+              </a:rPr>
+              <a:t>which convert</a:t>
+            </a:r>
+          </a:p>
+          <a:p>
+            <a:pPr marL="0" indent="0">
+              <a:spcBef>
+                <a:spcPts val="0"/>
+              </a:spcBef>
+              <a:buNone/>
+            </a:pPr>
+            <a:r>
+              <a:rPr lang="en-US" sz="1200" dirty="0">
+                <a:latin typeface="Courier New" panose="02070309020205020404" pitchFamily="49" charset="0"/>
+                <a:cs typeface="Courier New" panose="02070309020205020404" pitchFamily="49" charset="0"/>
+              </a:rPr>
+              <a:t>/</a:t>
+            </a:r>
+            <a:r>
+              <a:rPr lang="en-US" sz="1200" dirty="0" err="1">
+                <a:latin typeface="Courier New" panose="02070309020205020404" pitchFamily="49" charset="0"/>
+                <a:cs typeface="Courier New" panose="02070309020205020404" pitchFamily="49" charset="0"/>
+              </a:rPr>
+              <a:t>usr</a:t>
+            </a:r>
+            <a:r>
+              <a:rPr lang="en-US" sz="1200" dirty="0">
+                <a:latin typeface="Courier New" panose="02070309020205020404" pitchFamily="49" charset="0"/>
+                <a:cs typeface="Courier New" panose="02070309020205020404" pitchFamily="49" charset="0"/>
+              </a:rPr>
+              <a:t>/local/bin/convert</a:t>
+            </a:r>
+          </a:p>
+          <a:p>
+            <a:pPr marL="0" indent="0">
+              <a:spcBef>
+                <a:spcPts val="0"/>
+              </a:spcBef>
+              <a:buNone/>
+            </a:pPr>
+            <a:endParaRPr lang="en-US" sz="1200" b="1" dirty="0">
+              <a:latin typeface="Courier New" panose="02070309020205020404" pitchFamily="49" charset="0"/>
+              <a:cs typeface="Courier New" panose="02070309020205020404" pitchFamily="49" charset="0"/>
+            </a:endParaRPr>
+          </a:p>
+        </p:txBody>
+      </p:sp>
+    </p:spTree>
+    <p:extLst>
+      <p:ext uri="{BB962C8B-B14F-4D97-AF65-F5344CB8AC3E}">
+        <p14:creationId xmlns:p14="http://schemas.microsoft.com/office/powerpoint/2010/main" val="2631756468"/>
+      </p:ext>
+    </p:extLst>
+  </p:cSld>
+  <p:clrMapOvr>
+    <a:masterClrMapping/>
+  </p:clrMapOvr>
+</p:sld>
+</file>
+
+<file path=ppt/slides/slide31.xml><?xml version="1.0" encoding="utf-8"?>
+<p:sld xmlns:a="http://schemas.openxmlformats.org/drawingml/2006/main" xmlns:r="http://schemas.openxmlformats.org/officeDocument/2006/relationships" xmlns:p="http://schemas.openxmlformats.org/presentationml/2006/main">
+  <p:cSld>
+    <p:spTree>
+      <p:nvGrpSpPr>
+        <p:cNvPr id="1" name=""/>
+        <p:cNvGrpSpPr/>
+        <p:nvPr/>
+      </p:nvGrpSpPr>
+      <p:grpSpPr>
+        <a:xfrm>
+          <a:off x="0" y="0"/>
+          <a:ext cx="0" cy="0"/>
+          <a:chOff x="0" y="0"/>
+          <a:chExt cx="0" cy="0"/>
+        </a:xfrm>
+      </p:grpSpPr>
+      <p:sp>
+        <p:nvSpPr>
+          <p:cNvPr id="2" name="Title 1">
+            <a:extLst>
+              <a:ext uri="{FF2B5EF4-FFF2-40B4-BE49-F238E27FC236}">
+                <a16:creationId xmlns:a16="http://schemas.microsoft.com/office/drawing/2014/main" id="{6A279D37-B62F-714B-89C4-F3C8392D29DC}"/>
+              </a:ext>
+            </a:extLst>
+          </p:cNvPr>
+          <p:cNvSpPr>
+            <a:spLocks noGrp="1"/>
+          </p:cNvSpPr>
+          <p:nvPr>
+            <p:ph type="title"/>
+          </p:nvPr>
+        </p:nvSpPr>
+        <p:spPr/>
+        <p:txBody>
+          <a:bodyPr/>
+          <a:lstStyle/>
+          <a:p>
+            <a:r>
+              <a:rPr lang="en-US" dirty="0" err="1"/>
+              <a:t>ImageMagick</a:t>
+            </a:r>
+            <a:r>
+              <a:rPr lang="en-US" dirty="0"/>
+              <a:t> (2)</a:t>
+            </a:r>
+          </a:p>
+        </p:txBody>
+      </p:sp>
+      <p:sp>
+        <p:nvSpPr>
+          <p:cNvPr id="3" name="Content Placeholder 2">
+            <a:extLst>
+              <a:ext uri="{FF2B5EF4-FFF2-40B4-BE49-F238E27FC236}">
+                <a16:creationId xmlns:a16="http://schemas.microsoft.com/office/drawing/2014/main" id="{EF8FE15D-1FA9-C442-A734-A76FCD711FFD}"/>
+              </a:ext>
+            </a:extLst>
+          </p:cNvPr>
+          <p:cNvSpPr>
+            <a:spLocks noGrp="1"/>
+          </p:cNvSpPr>
+          <p:nvPr>
+            <p:ph idx="1"/>
+          </p:nvPr>
+        </p:nvSpPr>
+        <p:spPr>
+          <a:xfrm>
+            <a:off x="161364" y="751756"/>
+            <a:ext cx="8982635" cy="3749040"/>
+          </a:xfrm>
+        </p:spPr>
+        <p:txBody>
+          <a:bodyPr>
+            <a:normAutofit/>
+          </a:bodyPr>
+          <a:lstStyle/>
+          <a:p>
+            <a:pPr marL="0" indent="0">
+              <a:spcBef>
+                <a:spcPts val="0"/>
+              </a:spcBef>
+              <a:buNone/>
+            </a:pPr>
+            <a:r>
+              <a:rPr lang="en-US" sz="1400" dirty="0"/>
+              <a:t>Refer to the </a:t>
+            </a:r>
+            <a:r>
+              <a:rPr lang="en-US" sz="1400" dirty="0" err="1"/>
+              <a:t>Quickstart</a:t>
+            </a:r>
+            <a:r>
+              <a:rPr lang="en-US" sz="1400" dirty="0"/>
+              <a:t> guide for helpful </a:t>
+            </a:r>
+            <a:r>
+              <a:rPr lang="en-US" sz="1400" dirty="0" err="1"/>
+              <a:t>ImageMagick</a:t>
+            </a:r>
+            <a:r>
+              <a:rPr lang="en-US" sz="1400" dirty="0"/>
+              <a:t> commands, including </a:t>
+            </a:r>
+            <a:r>
+              <a:rPr lang="en-US" sz="1400" dirty="0" err="1"/>
+              <a:t>Makefile</a:t>
+            </a:r>
+            <a:r>
+              <a:rPr lang="en-US" sz="1400" dirty="0"/>
+              <a:t> targets: </a:t>
+            </a:r>
+            <a:r>
+              <a:rPr lang="en-US" sz="1400" dirty="0">
+                <a:hlinkClick r:id="rId2"/>
+              </a:rPr>
+              <a:t>https://github.com/MathCancer/PhysiCell/blob/master/documentation/Quickstart.md#imagemagick</a:t>
+            </a:r>
+            <a:r>
+              <a:rPr lang="en-US" sz="1400" dirty="0"/>
+              <a:t> </a:t>
+            </a:r>
+            <a:endParaRPr lang="en-US" sz="1400" b="1" dirty="0">
+              <a:cs typeface="Courier New" panose="02070309020205020404" pitchFamily="49" charset="0"/>
+            </a:endParaRPr>
+          </a:p>
+          <a:p>
+            <a:pPr marL="0" indent="0">
+              <a:spcBef>
+                <a:spcPts val="0"/>
+              </a:spcBef>
+              <a:buNone/>
+            </a:pPr>
+            <a:endParaRPr lang="en-US" sz="1200" dirty="0">
+              <a:cs typeface="Courier New" panose="02070309020205020404" pitchFamily="49" charset="0"/>
+            </a:endParaRPr>
+          </a:p>
+          <a:p>
+            <a:pPr marL="0" indent="0">
+              <a:spcBef>
+                <a:spcPts val="0"/>
+              </a:spcBef>
+              <a:buNone/>
+            </a:pPr>
+            <a:endParaRPr lang="en-US" sz="1200" dirty="0">
+              <a:cs typeface="Courier New" panose="02070309020205020404" pitchFamily="49" charset="0"/>
+            </a:endParaRPr>
+          </a:p>
+          <a:p>
+            <a:pPr marL="0" indent="0">
+              <a:spcBef>
+                <a:spcPts val="0"/>
+              </a:spcBef>
+              <a:buNone/>
+            </a:pPr>
+            <a:r>
+              <a:rPr lang="en-US" sz="1400" dirty="0">
+                <a:cs typeface="Courier New" panose="02070309020205020404" pitchFamily="49" charset="0"/>
+              </a:rPr>
+              <a:t>For example, if you have generated some .</a:t>
+            </a:r>
+            <a:r>
+              <a:rPr lang="en-US" sz="1400" dirty="0" err="1">
+                <a:cs typeface="Courier New" panose="02070309020205020404" pitchFamily="49" charset="0"/>
+              </a:rPr>
+              <a:t>svg</a:t>
+            </a:r>
+            <a:r>
+              <a:rPr lang="en-US" sz="1400" dirty="0">
+                <a:cs typeface="Courier New" panose="02070309020205020404" pitchFamily="49" charset="0"/>
+              </a:rPr>
+              <a:t> files (in /output), you should be able to generate an animation, using something like the following set of commands in your shell:</a:t>
+            </a:r>
+          </a:p>
+          <a:p>
+            <a:pPr marL="0" indent="0">
+              <a:spcBef>
+                <a:spcPts val="0"/>
+              </a:spcBef>
+              <a:buNone/>
+            </a:pPr>
+            <a:endParaRPr lang="en-US" sz="1400" dirty="0">
+              <a:cs typeface="Courier New" panose="02070309020205020404" pitchFamily="49" charset="0"/>
+            </a:endParaRPr>
+          </a:p>
+          <a:p>
+            <a:pPr marL="0" indent="0">
+              <a:spcBef>
+                <a:spcPts val="0"/>
+              </a:spcBef>
+              <a:buNone/>
+            </a:pPr>
+            <a:r>
+              <a:rPr lang="en-US" sz="1200" b="1" dirty="0">
+                <a:latin typeface="Courier New" panose="02070309020205020404" pitchFamily="49" charset="0"/>
+                <a:cs typeface="Courier New" panose="02070309020205020404" pitchFamily="49" charset="0"/>
+              </a:rPr>
+              <a:t>convert snapshot000034*.</a:t>
+            </a:r>
+            <a:r>
+              <a:rPr lang="en-US" sz="1200" b="1" dirty="0" err="1">
+                <a:latin typeface="Courier New" panose="02070309020205020404" pitchFamily="49" charset="0"/>
+                <a:cs typeface="Courier New" panose="02070309020205020404" pitchFamily="49" charset="0"/>
+              </a:rPr>
+              <a:t>svg</a:t>
+            </a:r>
+            <a:r>
+              <a:rPr lang="en-US" sz="1200" b="1" dirty="0">
+                <a:latin typeface="Courier New" panose="02070309020205020404" pitchFamily="49" charset="0"/>
+                <a:cs typeface="Courier New" panose="02070309020205020404" pitchFamily="49" charset="0"/>
+              </a:rPr>
+              <a:t> </a:t>
+            </a:r>
+            <a:r>
+              <a:rPr lang="en-US" sz="1200" b="1" dirty="0" err="1">
+                <a:latin typeface="Courier New" panose="02070309020205020404" pitchFamily="49" charset="0"/>
+                <a:cs typeface="Courier New" panose="02070309020205020404" pitchFamily="49" charset="0"/>
+              </a:rPr>
+              <a:t>foo.gif</a:t>
+            </a:r>
+            <a:r>
+              <a:rPr lang="en-US" sz="1200" b="1" dirty="0">
+                <a:latin typeface="Courier New" panose="02070309020205020404" pitchFamily="49" charset="0"/>
+                <a:cs typeface="Courier New" panose="02070309020205020404" pitchFamily="49" charset="0"/>
+              </a:rPr>
+              <a:t> </a:t>
+            </a:r>
+          </a:p>
+          <a:p>
+            <a:pPr marL="0" indent="0">
+              <a:spcBef>
+                <a:spcPts val="0"/>
+              </a:spcBef>
+              <a:buNone/>
+            </a:pPr>
+            <a:r>
+              <a:rPr lang="en-US" sz="1200" b="1" dirty="0" err="1">
+                <a:latin typeface="Courier New" panose="02070309020205020404" pitchFamily="49" charset="0"/>
+                <a:cs typeface="Courier New" panose="02070309020205020404" pitchFamily="49" charset="0"/>
+              </a:rPr>
+              <a:t>magick</a:t>
+            </a:r>
+            <a:r>
+              <a:rPr lang="en-US" sz="1200" b="1" dirty="0">
+                <a:latin typeface="Courier New" panose="02070309020205020404" pitchFamily="49" charset="0"/>
+                <a:cs typeface="Courier New" panose="02070309020205020404" pitchFamily="49" charset="0"/>
+              </a:rPr>
+              <a:t> animate </a:t>
+            </a:r>
+            <a:r>
+              <a:rPr lang="en-US" sz="1200" b="1" dirty="0" err="1">
+                <a:latin typeface="Courier New" panose="02070309020205020404" pitchFamily="49" charset="0"/>
+                <a:cs typeface="Courier New" panose="02070309020205020404" pitchFamily="49" charset="0"/>
+              </a:rPr>
+              <a:t>foo.gif</a:t>
+            </a:r>
+            <a:r>
+              <a:rPr lang="en-US" sz="1200" b="1" dirty="0">
+                <a:latin typeface="Courier New" panose="02070309020205020404" pitchFamily="49" charset="0"/>
+                <a:cs typeface="Courier New" panose="02070309020205020404" pitchFamily="49" charset="0"/>
+              </a:rPr>
+              <a:t>           </a:t>
+            </a:r>
+            <a:r>
+              <a:rPr lang="en-US" sz="1200" dirty="0">
+                <a:cs typeface="Courier New" panose="02070309020205020404" pitchFamily="49" charset="0"/>
+              </a:rPr>
+              <a:t># may be huge, if original SVGs were; downsize in following steps </a:t>
+            </a:r>
+          </a:p>
+          <a:p>
+            <a:pPr marL="0" indent="0">
+              <a:spcBef>
+                <a:spcPts val="0"/>
+              </a:spcBef>
+              <a:buNone/>
+            </a:pPr>
+            <a:r>
+              <a:rPr lang="en-US" sz="1200" b="1" dirty="0">
+                <a:latin typeface="Courier New" panose="02070309020205020404" pitchFamily="49" charset="0"/>
+                <a:cs typeface="Courier New" panose="02070309020205020404" pitchFamily="49" charset="0"/>
+              </a:rPr>
+              <a:t>convert </a:t>
+            </a:r>
+            <a:r>
+              <a:rPr lang="en-US" sz="1200" b="1" dirty="0" err="1">
+                <a:latin typeface="Courier New" panose="02070309020205020404" pitchFamily="49" charset="0"/>
+                <a:cs typeface="Courier New" panose="02070309020205020404" pitchFamily="49" charset="0"/>
+              </a:rPr>
+              <a:t>foo.gif</a:t>
+            </a:r>
+            <a:r>
+              <a:rPr lang="en-US" sz="1200" b="1" dirty="0">
+                <a:latin typeface="Courier New" panose="02070309020205020404" pitchFamily="49" charset="0"/>
+                <a:cs typeface="Courier New" panose="02070309020205020404" pitchFamily="49" charset="0"/>
+              </a:rPr>
+              <a:t> -coalesce </a:t>
+            </a:r>
+            <a:r>
+              <a:rPr lang="en-US" sz="1200" b="1" dirty="0" err="1">
+                <a:latin typeface="Courier New" panose="02070309020205020404" pitchFamily="49" charset="0"/>
+                <a:cs typeface="Courier New" panose="02070309020205020404" pitchFamily="49" charset="0"/>
+              </a:rPr>
+              <a:t>tmp.gif</a:t>
+            </a:r>
+            <a:r>
+              <a:rPr lang="en-US" sz="1200" b="1" dirty="0">
+                <a:latin typeface="Courier New" panose="02070309020205020404" pitchFamily="49" charset="0"/>
+                <a:cs typeface="Courier New" panose="02070309020205020404" pitchFamily="49" charset="0"/>
+              </a:rPr>
+              <a:t> </a:t>
+            </a:r>
+          </a:p>
+          <a:p>
+            <a:pPr marL="0" indent="0">
+              <a:spcBef>
+                <a:spcPts val="0"/>
+              </a:spcBef>
+              <a:buNone/>
+            </a:pPr>
+            <a:r>
+              <a:rPr lang="en-US" sz="1200" b="1" dirty="0">
+                <a:latin typeface="Courier New" panose="02070309020205020404" pitchFamily="49" charset="0"/>
+                <a:cs typeface="Courier New" panose="02070309020205020404" pitchFamily="49" charset="0"/>
+              </a:rPr>
+              <a:t>identify snapshot00003471.svg    </a:t>
+            </a:r>
+            <a:r>
+              <a:rPr lang="en-US" sz="1200" dirty="0">
+                <a:cs typeface="Courier New" panose="02070309020205020404" pitchFamily="49" charset="0"/>
+              </a:rPr>
+              <a:t># get size of a single image (e.g. 1500x1605) </a:t>
+            </a:r>
+          </a:p>
+          <a:p>
+            <a:pPr marL="0" indent="0">
+              <a:spcBef>
+                <a:spcPts val="0"/>
+              </a:spcBef>
+              <a:buNone/>
+            </a:pPr>
+            <a:r>
+              <a:rPr lang="en-US" sz="1200" b="1" dirty="0">
+                <a:latin typeface="Courier New" panose="02070309020205020404" pitchFamily="49" charset="0"/>
+                <a:cs typeface="Courier New" panose="02070309020205020404" pitchFamily="49" charset="0"/>
+              </a:rPr>
+              <a:t>convert -size 1500x1605 </a:t>
+            </a:r>
+            <a:r>
+              <a:rPr lang="en-US" sz="1200" b="1" dirty="0" err="1">
+                <a:latin typeface="Courier New" panose="02070309020205020404" pitchFamily="49" charset="0"/>
+                <a:cs typeface="Courier New" panose="02070309020205020404" pitchFamily="49" charset="0"/>
+              </a:rPr>
+              <a:t>tmp.gif</a:t>
+            </a:r>
+            <a:r>
+              <a:rPr lang="en-US" sz="1200" b="1" dirty="0">
+                <a:latin typeface="Courier New" panose="02070309020205020404" pitchFamily="49" charset="0"/>
+                <a:cs typeface="Courier New" panose="02070309020205020404" pitchFamily="49" charset="0"/>
+              </a:rPr>
+              <a:t> -resize 20% </a:t>
+            </a:r>
+            <a:r>
+              <a:rPr lang="en-US" sz="1200" b="1" dirty="0" err="1">
+                <a:latin typeface="Courier New" panose="02070309020205020404" pitchFamily="49" charset="0"/>
+                <a:cs typeface="Courier New" panose="02070309020205020404" pitchFamily="49" charset="0"/>
+              </a:rPr>
+              <a:t>small.gif</a:t>
+            </a:r>
+            <a:r>
+              <a:rPr lang="en-US" sz="1200" b="1" dirty="0">
+                <a:latin typeface="Courier New" panose="02070309020205020404" pitchFamily="49" charset="0"/>
+                <a:cs typeface="Courier New" panose="02070309020205020404" pitchFamily="49" charset="0"/>
+              </a:rPr>
+              <a:t> </a:t>
+            </a:r>
+          </a:p>
+          <a:p>
+            <a:pPr marL="0" indent="0">
+              <a:spcBef>
+                <a:spcPts val="0"/>
+              </a:spcBef>
+              <a:buNone/>
+            </a:pPr>
+            <a:r>
+              <a:rPr lang="en-US" sz="1200" b="1" dirty="0" err="1">
+                <a:latin typeface="Courier New" panose="02070309020205020404" pitchFamily="49" charset="0"/>
+                <a:cs typeface="Courier New" panose="02070309020205020404" pitchFamily="49" charset="0"/>
+              </a:rPr>
+              <a:t>magick</a:t>
+            </a:r>
+            <a:r>
+              <a:rPr lang="en-US" sz="1200" b="1" dirty="0">
+                <a:latin typeface="Courier New" panose="02070309020205020404" pitchFamily="49" charset="0"/>
+                <a:cs typeface="Courier New" panose="02070309020205020404" pitchFamily="49" charset="0"/>
+              </a:rPr>
+              <a:t> animate </a:t>
+            </a:r>
+            <a:r>
+              <a:rPr lang="en-US" sz="1200" b="1" dirty="0" err="1">
+                <a:latin typeface="Courier New" panose="02070309020205020404" pitchFamily="49" charset="0"/>
+                <a:cs typeface="Courier New" panose="02070309020205020404" pitchFamily="49" charset="0"/>
+              </a:rPr>
+              <a:t>small.gif</a:t>
+            </a:r>
+            <a:endParaRPr lang="en-US" sz="1200" b="1" dirty="0">
+              <a:latin typeface="Courier New" panose="02070309020205020404" pitchFamily="49" charset="0"/>
+              <a:cs typeface="Courier New" panose="02070309020205020404" pitchFamily="49" charset="0"/>
+            </a:endParaRPr>
+          </a:p>
+        </p:txBody>
+      </p:sp>
+    </p:spTree>
+    <p:extLst>
+      <p:ext uri="{BB962C8B-B14F-4D97-AF65-F5344CB8AC3E}">
+        <p14:creationId xmlns:p14="http://schemas.microsoft.com/office/powerpoint/2010/main" val="2875488442"/>
+      </p:ext>
+    </p:extLst>
+  </p:cSld>
+  <p:clrMapOvr>
+    <a:masterClrMapping/>
+  </p:clrMapOvr>
+</p:sld>
+</file>
+
+<file path=ppt/slides/slide32.xml><?xml version="1.0" encoding="utf-8"?>
+<p:sld xmlns:a="http://schemas.openxmlformats.org/drawingml/2006/main" xmlns:r="http://schemas.openxmlformats.org/officeDocument/2006/relationships" xmlns:p="http://schemas.openxmlformats.org/presentationml/2006/main">
+  <p:cSld>
+    <p:spTree>
+      <p:nvGrpSpPr>
+        <p:cNvPr id="1" name=""/>
+        <p:cNvGrpSpPr/>
+        <p:nvPr/>
+      </p:nvGrpSpPr>
+      <p:grpSpPr>
+        <a:xfrm>
+          <a:off x="0" y="0"/>
+          <a:ext cx="0" cy="0"/>
+          <a:chOff x="0" y="0"/>
+          <a:chExt cx="0" cy="0"/>
+        </a:xfrm>
+      </p:grpSpPr>
+      <p:sp>
+        <p:nvSpPr>
+          <p:cNvPr id="2" name="Title 1">
+            <a:extLst>
+              <a:ext uri="{FF2B5EF4-FFF2-40B4-BE49-F238E27FC236}">
+                <a16:creationId xmlns:a16="http://schemas.microsoft.com/office/drawing/2014/main" id="{53A6FBB7-CD65-1E4B-9CBF-56F038F6A827}"/>
+              </a:ext>
+            </a:extLst>
+          </p:cNvPr>
+          <p:cNvSpPr>
+            <a:spLocks noGrp="1"/>
+          </p:cNvSpPr>
+          <p:nvPr>
+            <p:ph type="title"/>
+          </p:nvPr>
+        </p:nvSpPr>
+        <p:spPr/>
+        <p:txBody>
+          <a:bodyPr/>
+          <a:lstStyle/>
+          <a:p>
+            <a:r>
+              <a:rPr lang="en-US" dirty="0"/>
+              <a:t>Overview </a:t>
+            </a:r>
+          </a:p>
+        </p:txBody>
+      </p:sp>
+      <p:sp>
+        <p:nvSpPr>
+          <p:cNvPr id="3" name="Content Placeholder 2">
+            <a:extLst>
+              <a:ext uri="{FF2B5EF4-FFF2-40B4-BE49-F238E27FC236}">
+                <a16:creationId xmlns:a16="http://schemas.microsoft.com/office/drawing/2014/main" id="{8B6A701D-A58F-5648-929D-C0F4C803C53A}"/>
+              </a:ext>
+            </a:extLst>
+          </p:cNvPr>
+          <p:cNvSpPr>
+            <a:spLocks noGrp="1"/>
+          </p:cNvSpPr>
+          <p:nvPr>
+            <p:ph idx="1"/>
+          </p:nvPr>
+        </p:nvSpPr>
+        <p:spPr>
+          <a:xfrm>
+            <a:off x="805424" y="824691"/>
+            <a:ext cx="8187655" cy="3494117"/>
+          </a:xfrm>
+        </p:spPr>
+        <p:txBody>
+          <a:bodyPr>
+            <a:normAutofit/>
+          </a:bodyPr>
+          <a:lstStyle/>
+          <a:p>
+            <a:r>
+              <a:rPr lang="en-US" sz="1400" dirty="0">
+                <a:solidFill>
+                  <a:schemeClr val="tx1">
+                    <a:alpha val="20000"/>
+                  </a:schemeClr>
+                </a:solidFill>
+              </a:rPr>
+              <a:t>Apple Intel CPU vs. Silicon (M1) CPU</a:t>
+            </a:r>
+          </a:p>
+          <a:p>
+            <a:pPr lvl="2"/>
+            <a:r>
+              <a:rPr lang="en-US" sz="1400" dirty="0">
+                <a:solidFill>
+                  <a:schemeClr val="tx1">
+                    <a:alpha val="20000"/>
+                  </a:schemeClr>
+                </a:solidFill>
+              </a:rPr>
+              <a:t> You may experience some problems with our setup instructions if you have the newer Apple Silicon CPU. If so, please contact us (see Support page at end).</a:t>
+            </a:r>
+          </a:p>
+          <a:p>
+            <a:r>
+              <a:rPr lang="en-US" sz="1400" dirty="0">
+                <a:solidFill>
+                  <a:schemeClr val="tx1">
+                    <a:alpha val="20000"/>
+                  </a:schemeClr>
+                </a:solidFill>
+              </a:rPr>
+              <a:t>OpenMP-enabled g++ (using Homebrew)</a:t>
+            </a:r>
+          </a:p>
+          <a:p>
+            <a:r>
+              <a:rPr lang="en-US" sz="1400" dirty="0">
+                <a:solidFill>
+                  <a:schemeClr val="tx1">
+                    <a:alpha val="20000"/>
+                  </a:schemeClr>
+                </a:solidFill>
+              </a:rPr>
+              <a:t>Test building the default model (“heterogeneity”)</a:t>
+            </a:r>
+          </a:p>
+          <a:p>
+            <a:r>
+              <a:rPr lang="en-US" sz="1400" dirty="0">
+                <a:solidFill>
+                  <a:schemeClr val="tx1">
+                    <a:alpha val="20000"/>
+                  </a:schemeClr>
+                </a:solidFill>
+              </a:rPr>
+              <a:t>Python 3 (using Anaconda distribution)</a:t>
+            </a:r>
+          </a:p>
+          <a:p>
+            <a:r>
+              <a:rPr lang="en-US" sz="1400" dirty="0">
+                <a:solidFill>
+                  <a:schemeClr val="tx1">
+                    <a:alpha val="20000"/>
+                  </a:schemeClr>
+                </a:solidFill>
+              </a:rPr>
+              <a:t>Test building an intracellular model</a:t>
+            </a:r>
+          </a:p>
+          <a:p>
+            <a:r>
+              <a:rPr lang="en-US" sz="1400" dirty="0" err="1">
+                <a:solidFill>
+                  <a:schemeClr val="tx1">
+                    <a:alpha val="20000"/>
+                  </a:schemeClr>
+                </a:solidFill>
+              </a:rPr>
+              <a:t>ImageMagick</a:t>
+            </a:r>
+            <a:endParaRPr lang="en-US" sz="1400" dirty="0">
+              <a:solidFill>
+                <a:schemeClr val="tx1">
+                  <a:alpha val="20000"/>
+                </a:schemeClr>
+              </a:solidFill>
+            </a:endParaRPr>
+          </a:p>
+          <a:p>
+            <a:r>
+              <a:rPr lang="en-US" sz="1400" dirty="0"/>
+              <a:t>PhysiCell Model Builder</a:t>
+            </a:r>
+          </a:p>
+          <a:p>
+            <a:pPr marL="0" indent="0">
+              <a:buNone/>
+            </a:pPr>
+            <a:endParaRPr lang="en-US" sz="1400" dirty="0">
+              <a:solidFill>
+                <a:schemeClr val="tx1">
+                  <a:alpha val="20000"/>
+                </a:schemeClr>
+              </a:solidFill>
+            </a:endParaRPr>
+          </a:p>
+        </p:txBody>
+      </p:sp>
+    </p:spTree>
+    <p:extLst>
+      <p:ext uri="{BB962C8B-B14F-4D97-AF65-F5344CB8AC3E}">
+        <p14:creationId xmlns:p14="http://schemas.microsoft.com/office/powerpoint/2010/main" val="3262922837"/>
+      </p:ext>
+    </p:extLst>
+  </p:cSld>
+  <p:clrMapOvr>
+    <a:masterClrMapping/>
+  </p:clrMapOvr>
+</p:sld>
+</file>
+
+<file path=ppt/slides/slide33.xml><?xml version="1.0" encoding="utf-8"?>
+<p:sld xmlns:a="http://schemas.openxmlformats.org/drawingml/2006/main" xmlns:r="http://schemas.openxmlformats.org/officeDocument/2006/relationships" xmlns:p="http://schemas.openxmlformats.org/presentationml/2006/main">
+  <p:cSld>
+    <p:spTree>
+      <p:nvGrpSpPr>
+        <p:cNvPr id="1" name=""/>
+        <p:cNvGrpSpPr/>
+        <p:nvPr/>
+      </p:nvGrpSpPr>
+      <p:grpSpPr>
+        <a:xfrm>
+          <a:off x="0" y="0"/>
+          <a:ext cx="0" cy="0"/>
+          <a:chOff x="0" y="0"/>
+          <a:chExt cx="0" cy="0"/>
+        </a:xfrm>
+      </p:grpSpPr>
+      <p:sp>
+        <p:nvSpPr>
+          <p:cNvPr id="2" name="Title 1">
+            <a:extLst>
+              <a:ext uri="{FF2B5EF4-FFF2-40B4-BE49-F238E27FC236}">
+                <a16:creationId xmlns:a16="http://schemas.microsoft.com/office/drawing/2014/main" id="{F3F26D57-0E97-B246-8F6B-C5C1EEA1B1F9}"/>
+              </a:ext>
+            </a:extLst>
+          </p:cNvPr>
+          <p:cNvSpPr>
+            <a:spLocks noGrp="1"/>
+          </p:cNvSpPr>
+          <p:nvPr>
+            <p:ph type="title"/>
+          </p:nvPr>
+        </p:nvSpPr>
+        <p:spPr/>
+        <p:txBody>
+          <a:bodyPr/>
+          <a:lstStyle/>
+          <a:p>
+            <a:r>
+              <a:rPr lang="en-US" dirty="0"/>
+              <a:t>PhysiCell Model Builder (1)</a:t>
+            </a:r>
+          </a:p>
+        </p:txBody>
+      </p:sp>
+      <p:sp>
+        <p:nvSpPr>
+          <p:cNvPr id="3" name="Content Placeholder 2">
+            <a:extLst>
+              <a:ext uri="{FF2B5EF4-FFF2-40B4-BE49-F238E27FC236}">
+                <a16:creationId xmlns:a16="http://schemas.microsoft.com/office/drawing/2014/main" id="{5EB54847-329D-6D4E-8BBF-F15B64C5A19A}"/>
+              </a:ext>
+            </a:extLst>
+          </p:cNvPr>
+          <p:cNvSpPr>
+            <a:spLocks noGrp="1"/>
+          </p:cNvSpPr>
+          <p:nvPr>
+            <p:ph idx="1"/>
+          </p:nvPr>
+        </p:nvSpPr>
+        <p:spPr>
+          <a:xfrm>
+            <a:off x="320510" y="751756"/>
+            <a:ext cx="8361577" cy="3749040"/>
+          </a:xfrm>
+        </p:spPr>
+        <p:txBody>
+          <a:bodyPr/>
+          <a:lstStyle/>
+          <a:p>
+            <a:r>
+              <a:rPr lang="en-US" dirty="0"/>
+              <a:t>The Model Builder is a GUI to let you create/edit a .xml configuration file that defines (nearly all of) a PhysiCell model.</a:t>
+            </a:r>
+          </a:p>
+          <a:p>
+            <a:r>
+              <a:rPr lang="en-US" dirty="0"/>
+              <a:t>Download the latest release at:  </a:t>
+            </a:r>
+          </a:p>
+          <a:p>
+            <a:pPr marL="173037" lvl="1" indent="0">
+              <a:buNone/>
+            </a:pPr>
+            <a:r>
+              <a:rPr lang="en-US" sz="1600" dirty="0">
+                <a:hlinkClick r:id="rId2"/>
+              </a:rPr>
+              <a:t>https://github.com/PhysiCell-Tools/PhysiCell-model-builder/releases</a:t>
+            </a:r>
+            <a:endParaRPr lang="en-US" sz="1600" dirty="0"/>
+          </a:p>
+          <a:p>
+            <a:r>
+              <a:rPr lang="en-US" dirty="0" err="1"/>
+              <a:t>Uncompress</a:t>
+            </a:r>
+            <a:r>
+              <a:rPr lang="en-US" dirty="0"/>
+              <a:t> the .zip, change directory into it, and run it:</a:t>
+            </a:r>
+          </a:p>
+          <a:p>
+            <a:endParaRPr lang="en-US" dirty="0"/>
+          </a:p>
+          <a:p>
+            <a:pPr marL="0" indent="0">
+              <a:buNone/>
+            </a:pPr>
+            <a:endParaRPr lang="en-US" dirty="0"/>
+          </a:p>
+          <a:p>
+            <a:pPr marL="0" indent="0">
+              <a:buNone/>
+            </a:pPr>
+            <a:r>
+              <a:rPr lang="en-US" dirty="0"/>
+              <a:t>This should display the GUI (next page):</a:t>
+            </a:r>
+          </a:p>
+        </p:txBody>
+      </p:sp>
+      <p:sp>
+        <p:nvSpPr>
+          <p:cNvPr id="5" name="TextBox 4">
+            <a:extLst>
+              <a:ext uri="{FF2B5EF4-FFF2-40B4-BE49-F238E27FC236}">
+                <a16:creationId xmlns:a16="http://schemas.microsoft.com/office/drawing/2014/main" id="{F7ADC12E-D17C-F54B-B7CF-854FDF15A47D}"/>
+              </a:ext>
+            </a:extLst>
+          </p:cNvPr>
+          <p:cNvSpPr txBox="1"/>
+          <p:nvPr/>
+        </p:nvSpPr>
+        <p:spPr>
+          <a:xfrm>
+            <a:off x="707010" y="2626276"/>
+            <a:ext cx="4920792" cy="600164"/>
+          </a:xfrm>
+          <a:prstGeom prst="rect">
+            <a:avLst/>
+          </a:prstGeom>
+          <a:noFill/>
+        </p:spPr>
+        <p:txBody>
+          <a:bodyPr wrap="square" lIns="0" tIns="0" rIns="0" bIns="0" rtlCol="0">
+            <a:spAutoFit/>
+          </a:bodyPr>
+          <a:lstStyle/>
+          <a:p>
+            <a:r>
+              <a:rPr lang="en-US" dirty="0"/>
+              <a:t>$ </a:t>
+            </a:r>
+            <a:r>
+              <a:rPr lang="en-US" b="1" dirty="0">
+                <a:latin typeface="Courier New" panose="02070309020205020404" pitchFamily="49" charset="0"/>
+                <a:cs typeface="Courier New" panose="02070309020205020404" pitchFamily="49" charset="0"/>
+              </a:rPr>
+              <a:t>unzip PhysiCell-model-builder-1.1.zip</a:t>
+            </a:r>
+          </a:p>
+          <a:p>
+            <a:r>
+              <a:rPr lang="en-US" dirty="0"/>
+              <a:t>$ </a:t>
+            </a:r>
+            <a:r>
+              <a:rPr lang="en-US" b="1" dirty="0">
+                <a:latin typeface="Courier New" panose="02070309020205020404" pitchFamily="49" charset="0"/>
+                <a:cs typeface="Courier New" panose="02070309020205020404" pitchFamily="49" charset="0"/>
+              </a:rPr>
+              <a:t>cd PhysiCell-model-builder-1.1</a:t>
+            </a:r>
+          </a:p>
+          <a:p>
+            <a:r>
+              <a:rPr lang="en-US" dirty="0"/>
+              <a:t>$ </a:t>
+            </a:r>
+            <a:r>
+              <a:rPr lang="en-US" b="1" dirty="0">
+                <a:latin typeface="Courier New" panose="02070309020205020404" pitchFamily="49" charset="0"/>
+                <a:cs typeface="Courier New" panose="02070309020205020404" pitchFamily="49" charset="0"/>
+              </a:rPr>
+              <a:t>python bin/gui4xml.py</a:t>
+            </a:r>
+          </a:p>
+        </p:txBody>
+      </p:sp>
+    </p:spTree>
+    <p:extLst>
+      <p:ext uri="{BB962C8B-B14F-4D97-AF65-F5344CB8AC3E}">
+        <p14:creationId xmlns:p14="http://schemas.microsoft.com/office/powerpoint/2010/main" val="2854843169"/>
+      </p:ext>
+    </p:extLst>
+  </p:cSld>
+  <p:clrMapOvr>
+    <a:masterClrMapping/>
+  </p:clrMapOvr>
+</p:sld>
+</file>
+
+<file path=ppt/slides/slide34.xml><?xml version="1.0" encoding="utf-8"?>
+<p:sld xmlns:a="http://schemas.openxmlformats.org/drawingml/2006/main" xmlns:r="http://schemas.openxmlformats.org/officeDocument/2006/relationships" xmlns:p="http://schemas.openxmlformats.org/presentationml/2006/main">
+  <p:cSld>
+    <p:spTree>
+      <p:nvGrpSpPr>
+        <p:cNvPr id="1" name=""/>
+        <p:cNvGrpSpPr/>
+        <p:nvPr/>
+      </p:nvGrpSpPr>
+      <p:grpSpPr>
+        <a:xfrm>
+          <a:off x="0" y="0"/>
+          <a:ext cx="0" cy="0"/>
+          <a:chOff x="0" y="0"/>
+          <a:chExt cx="0" cy="0"/>
+        </a:xfrm>
+      </p:grpSpPr>
+      <p:sp>
+        <p:nvSpPr>
+          <p:cNvPr id="2" name="Title 1">
+            <a:extLst>
+              <a:ext uri="{FF2B5EF4-FFF2-40B4-BE49-F238E27FC236}">
+                <a16:creationId xmlns:a16="http://schemas.microsoft.com/office/drawing/2014/main" id="{F3F26D57-0E97-B246-8F6B-C5C1EEA1B1F9}"/>
+              </a:ext>
+            </a:extLst>
+          </p:cNvPr>
+          <p:cNvSpPr>
+            <a:spLocks noGrp="1"/>
+          </p:cNvSpPr>
+          <p:nvPr>
+            <p:ph type="title"/>
+          </p:nvPr>
+        </p:nvSpPr>
+        <p:spPr/>
+        <p:txBody>
+          <a:bodyPr/>
+          <a:lstStyle/>
+          <a:p>
+            <a:r>
+              <a:rPr lang="en-US" dirty="0"/>
+              <a:t>PhysiCell Model Builder (2)</a:t>
+            </a:r>
+          </a:p>
+        </p:txBody>
+      </p:sp>
+      <p:pic>
+        <p:nvPicPr>
+          <p:cNvPr id="6" name="Picture 5" descr="Table&#10;&#10;Description automatically generated with medium confidence">
+            <a:extLst>
+              <a:ext uri="{FF2B5EF4-FFF2-40B4-BE49-F238E27FC236}">
+                <a16:creationId xmlns:a16="http://schemas.microsoft.com/office/drawing/2014/main" id="{18F12704-4EAA-744A-BA6D-59426BB5F902}"/>
+              </a:ext>
+            </a:extLst>
+          </p:cNvPr>
+          <p:cNvPicPr>
+            <a:picLocks noChangeAspect="1"/>
+          </p:cNvPicPr>
+          <p:nvPr/>
+        </p:nvPicPr>
+        <p:blipFill rotWithShape="1">
+          <a:blip r:embed="rId2"/>
+          <a:srcRect b="9327"/>
+          <a:stretch/>
+        </p:blipFill>
+        <p:spPr>
+          <a:xfrm>
+            <a:off x="977461" y="705534"/>
+            <a:ext cx="5099844" cy="3732431"/>
+          </a:xfrm>
+          <a:prstGeom prst="rect">
+            <a:avLst/>
+          </a:prstGeom>
+        </p:spPr>
+      </p:pic>
+      <p:sp>
+        <p:nvSpPr>
+          <p:cNvPr id="7" name="TextBox 6">
+            <a:extLst>
+              <a:ext uri="{FF2B5EF4-FFF2-40B4-BE49-F238E27FC236}">
+                <a16:creationId xmlns:a16="http://schemas.microsoft.com/office/drawing/2014/main" id="{87153CDB-1DC6-9749-A1E0-E80CCCA04746}"/>
+              </a:ext>
+            </a:extLst>
+          </p:cNvPr>
+          <p:cNvSpPr txBox="1"/>
+          <p:nvPr/>
+        </p:nvSpPr>
+        <p:spPr>
+          <a:xfrm>
+            <a:off x="6290900" y="1159497"/>
+            <a:ext cx="2639505" cy="1200329"/>
+          </a:xfrm>
+          <a:prstGeom prst="rect">
+            <a:avLst/>
+          </a:prstGeom>
+          <a:noFill/>
+        </p:spPr>
+        <p:txBody>
+          <a:bodyPr wrap="square" lIns="0" tIns="0" rIns="0" bIns="0" rtlCol="0">
+            <a:spAutoFit/>
+          </a:bodyPr>
+          <a:lstStyle/>
+          <a:p>
+            <a:r>
+              <a:rPr lang="en-US" dirty="0"/>
+              <a:t>A User Guide for the Model Builder is still be written.</a:t>
+            </a:r>
+          </a:p>
+          <a:p>
+            <a:endParaRPr lang="en-US" dirty="0"/>
+          </a:p>
+          <a:p>
+            <a:r>
+              <a:rPr lang="en-US" dirty="0"/>
+              <a:t>It is a tool that is still considered “beta”, so your feedback will be very valuable.</a:t>
+            </a:r>
+          </a:p>
+        </p:txBody>
+      </p:sp>
+    </p:spTree>
+    <p:extLst>
+      <p:ext uri="{BB962C8B-B14F-4D97-AF65-F5344CB8AC3E}">
+        <p14:creationId xmlns:p14="http://schemas.microsoft.com/office/powerpoint/2010/main" val="119933139"/>
+      </p:ext>
+    </p:extLst>
+  </p:cSld>
+  <p:clrMapOvr>
+    <a:masterClrMapping/>
+  </p:clrMapOvr>
+</p:sld>
+</file>
+
+<file path=ppt/slides/slide35.xml><?xml version="1.0" encoding="utf-8"?>
+<p:sld xmlns:a="http://schemas.openxmlformats.org/drawingml/2006/main" xmlns:r="http://schemas.openxmlformats.org/officeDocument/2006/relationships" xmlns:p="http://schemas.openxmlformats.org/presentationml/2006/main">
+  <p:cSld>
+    <p:spTree>
+      <p:nvGrpSpPr>
+        <p:cNvPr id="1" name=""/>
+        <p:cNvGrpSpPr/>
+        <p:nvPr/>
+      </p:nvGrpSpPr>
+      <p:grpSpPr>
+        <a:xfrm>
+          <a:off x="0" y="0"/>
+          <a:ext cx="0" cy="0"/>
+          <a:chOff x="0" y="0"/>
+          <a:chExt cx="0" cy="0"/>
+        </a:xfrm>
+      </p:grpSpPr>
+      <p:sp>
+        <p:nvSpPr>
+          <p:cNvPr id="2" name="Title 1">
+            <a:extLst>
+              <a:ext uri="{FF2B5EF4-FFF2-40B4-BE49-F238E27FC236}">
+                <a16:creationId xmlns:a16="http://schemas.microsoft.com/office/drawing/2014/main" id="{22E04031-0E0F-6C40-9B72-33495FFB3DC4}"/>
+              </a:ext>
+            </a:extLst>
+          </p:cNvPr>
+          <p:cNvSpPr>
+            <a:spLocks noGrp="1"/>
+          </p:cNvSpPr>
+          <p:nvPr>
+            <p:ph type="title"/>
+          </p:nvPr>
+        </p:nvSpPr>
+        <p:spPr/>
+        <p:txBody>
+          <a:bodyPr/>
+          <a:lstStyle/>
+          <a:p>
+            <a:r>
+              <a:rPr lang="en-US" dirty="0"/>
+              <a:t>C++ Code editor</a:t>
+            </a:r>
+          </a:p>
+        </p:txBody>
+      </p:sp>
+      <p:sp>
+        <p:nvSpPr>
+          <p:cNvPr id="3" name="Content Placeholder 2">
+            <a:extLst>
+              <a:ext uri="{FF2B5EF4-FFF2-40B4-BE49-F238E27FC236}">
+                <a16:creationId xmlns:a16="http://schemas.microsoft.com/office/drawing/2014/main" id="{ED655D8D-41C8-5E48-85A7-12921480A6C3}"/>
+              </a:ext>
+            </a:extLst>
+          </p:cNvPr>
+          <p:cNvSpPr>
+            <a:spLocks noGrp="1"/>
+          </p:cNvSpPr>
+          <p:nvPr>
+            <p:ph idx="1"/>
+          </p:nvPr>
+        </p:nvSpPr>
+        <p:spPr>
+          <a:xfrm>
+            <a:off x="414778" y="751756"/>
+            <a:ext cx="8427563" cy="3749040"/>
+          </a:xfrm>
+        </p:spPr>
+        <p:txBody>
+          <a:bodyPr/>
+          <a:lstStyle/>
+          <a:p>
+            <a:pPr marL="0" indent="0">
+              <a:buNone/>
+            </a:pPr>
+            <a:r>
+              <a:rPr lang="en-US" dirty="0"/>
+              <a:t>When you get to the point of editing the custom C++ code for your model, you will want a decent code editor. If you’re already using one (for C or C++), great! - keep using it. But if you are new to programming, we recommend keeping it pretty simple. If you just search “C++ code editor macOS”, you’ll find some good suggestions. </a:t>
+            </a:r>
+          </a:p>
+          <a:p>
+            <a:pPr marL="0" indent="0">
+              <a:buNone/>
+            </a:pPr>
+            <a:endParaRPr lang="en-US" dirty="0"/>
+          </a:p>
+          <a:p>
+            <a:pPr marL="0" indent="0">
+              <a:buNone/>
+            </a:pPr>
+            <a:r>
+              <a:rPr lang="en-US" dirty="0"/>
+              <a:t>One popular, free integrated development environment (IDE) that can be used in a minimal fashion for editing is </a:t>
+            </a:r>
+            <a:r>
+              <a:rPr lang="en-US" dirty="0" err="1"/>
+              <a:t>VSCode</a:t>
+            </a:r>
+            <a:r>
+              <a:rPr lang="en-US" dirty="0"/>
+              <a:t> (</a:t>
+            </a:r>
+            <a:r>
+              <a:rPr lang="en-US" dirty="0">
+                <a:hlinkClick r:id="rId2"/>
+              </a:rPr>
+              <a:t>https://code.visualstudio.com/</a:t>
+            </a:r>
+            <a:r>
+              <a:rPr lang="en-US" dirty="0"/>
+              <a:t>).</a:t>
+            </a:r>
+          </a:p>
+        </p:txBody>
+      </p:sp>
+    </p:spTree>
+    <p:extLst>
+      <p:ext uri="{BB962C8B-B14F-4D97-AF65-F5344CB8AC3E}">
+        <p14:creationId xmlns:p14="http://schemas.microsoft.com/office/powerpoint/2010/main" val="613373584"/>
+      </p:ext>
+    </p:extLst>
+  </p:cSld>
+  <p:clrMapOvr>
+    <a:masterClrMapping/>
+  </p:clrMapOvr>
+</p:sld>
+</file>
+
+<file path=ppt/slides/slide36.xml><?xml version="1.0" encoding="utf-8"?>
+<p:sld xmlns:a="http://schemas.openxmlformats.org/drawingml/2006/main" xmlns:r="http://schemas.openxmlformats.org/officeDocument/2006/relationships" xmlns:p="http://schemas.openxmlformats.org/presentationml/2006/main">
+  <p:cSld>
+    <p:spTree>
+      <p:nvGrpSpPr>
+        <p:cNvPr id="1" name=""/>
+        <p:cNvGrpSpPr/>
+        <p:nvPr/>
+      </p:nvGrpSpPr>
+      <p:grpSpPr>
+        <a:xfrm>
+          <a:off x="0" y="0"/>
+          <a:ext cx="0" cy="0"/>
+          <a:chOff x="0" y="0"/>
+          <a:chExt cx="0" cy="0"/>
+        </a:xfrm>
+      </p:grpSpPr>
+      <p:sp>
+        <p:nvSpPr>
+          <p:cNvPr id="2" name="Title 1">
+            <a:extLst>
+              <a:ext uri="{FF2B5EF4-FFF2-40B4-BE49-F238E27FC236}">
                 <a16:creationId xmlns:a16="http://schemas.microsoft.com/office/drawing/2014/main" id="{01A47D1D-0F49-2141-A0FB-EF6065EBBF8A}"/>
               </a:ext>
             </a:extLst>
@@ -12023,7 +13727,7 @@
 </p:sld>
 </file>
 
-<file path=ppt/slides/slide31.xml><?xml version="1.0" encoding="utf-8"?>
+<file path=ppt/slides/slide37.xml><?xml version="1.0" encoding="utf-8"?>
 <p:sld xmlns:a="http://schemas.openxmlformats.org/drawingml/2006/main" xmlns:r="http://schemas.openxmlformats.org/officeDocument/2006/relationships" xmlns:p="http://schemas.openxmlformats.org/presentationml/2006/main">
   <p:cSld>
     <p:spTree>
@@ -12999,7 +14703,12 @@
             <p:ph idx="1"/>
           </p:nvPr>
         </p:nvSpPr>
-        <p:spPr/>
+        <p:spPr>
+          <a:xfrm>
+            <a:off x="0" y="697230"/>
+            <a:ext cx="9144000" cy="3749040"/>
+          </a:xfrm>
+        </p:spPr>
         <p:txBody>
           <a:bodyPr>
             <a:normAutofit/>
@@ -13285,6 +14994,17 @@
               </a:spcBef>
               <a:buNone/>
             </a:pPr>
+            <a:endParaRPr lang="en-US" sz="1200" dirty="0">
+              <a:cs typeface="Courier New" panose="02070309020205020404" pitchFamily="49" charset="0"/>
+            </a:endParaRPr>
+          </a:p>
+          <a:p>
+            <a:pPr marL="0" indent="0">
+              <a:spcBef>
+                <a:spcPts val="0"/>
+              </a:spcBef>
+              <a:buNone/>
+            </a:pPr>
             <a:r>
               <a:rPr lang="en-US" sz="1200" b="1" dirty="0">
                 <a:latin typeface="Courier New" panose="02070309020205020404" pitchFamily="49" charset="0"/>
@@ -13359,7 +15079,9 @@
               </a:rPr>
               <a:t>zshenv</a:t>
             </a:r>
-            <a:endParaRPr lang="en-US" sz="1400" dirty="0"/>
+            <a:endParaRPr lang="en-US" sz="900" dirty="0">
+              <a:hlinkClick r:id="rId3"/>
+            </a:endParaRPr>
           </a:p>
           <a:p>
             <a:pPr marL="0" indent="0">
@@ -13600,7 +15322,19 @@
             </a:pPr>
             <a:r>
               <a:rPr lang="en-US" sz="1400" dirty="0"/>
-              <a:t>When you open a new Terminal shell, you can verify that this is defined</a:t>
+              <a:t>When you open a </a:t>
+            </a:r>
+            <a:r>
+              <a:rPr lang="en-US" sz="1400" dirty="0">
+                <a:highlight>
+                  <a:srgbClr val="FFFF00"/>
+                </a:highlight>
+              </a:rPr>
+              <a:t>new</a:t>
+            </a:r>
+            <a:r>
+              <a:rPr lang="en-US" sz="1400" dirty="0"/>
+              <a:t> Terminal shell, you can verify that this is defined</a:t>
             </a:r>
             <a:r>
               <a:rPr lang="en-US" sz="1400" dirty="0">
@@ -13620,6 +15354,15 @@
               </a:rPr>
               <a:t>  echo $PHYSICELL_CPP</a:t>
             </a:r>
+          </a:p>
+          <a:p>
+            <a:pPr marL="0" indent="0">
+              <a:buNone/>
+            </a:pPr>
+            <a:endParaRPr lang="en-US" sz="1400" b="1" dirty="0">
+              <a:latin typeface="Courier New" panose="02070309020205020404" pitchFamily="49" charset="0"/>
+              <a:cs typeface="Courier New" panose="02070309020205020404" pitchFamily="49" charset="0"/>
+            </a:endParaRPr>
           </a:p>
           <a:p>
             <a:pPr marL="0" indent="0">
@@ -13740,7 +15483,7 @@
         </p:nvSpPr>
         <p:spPr>
           <a:xfrm>
-            <a:off x="956344" y="1006678"/>
+            <a:off x="805424" y="824691"/>
             <a:ext cx="8187655" cy="3494117"/>
           </a:xfrm>
         </p:spPr>
@@ -13751,7 +15494,7 @@
           <a:lstStyle/>
           <a:p>
             <a:r>
-              <a:rPr lang="en-US" sz="1800" dirty="0">
+              <a:rPr lang="en-US" sz="1400" dirty="0">
                 <a:solidFill>
                   <a:schemeClr val="tx1">
                     <a:alpha val="20000"/>
@@ -13764,7 +15507,7 @@
           <a:p>
             <a:pPr lvl="2"/>
             <a:r>
-              <a:rPr lang="en-US" sz="1800" dirty="0">
+              <a:rPr lang="en-US" sz="1400" dirty="0">
                 <a:solidFill>
                   <a:schemeClr val="tx1">
                     <a:alpha val="20000"/>
@@ -13776,7 +15519,7 @@
           </a:p>
           <a:p>
             <a:r>
-              <a:rPr lang="en-US" sz="1800" dirty="0">
+              <a:rPr lang="en-US" sz="1400" dirty="0">
                 <a:solidFill>
                   <a:schemeClr val="tx1">
                     <a:alpha val="20000"/>
@@ -13788,13 +15531,13 @@
           </a:p>
           <a:p>
             <a:r>
-              <a:rPr lang="en-US" sz="1800" dirty="0"/>
+              <a:rPr lang="en-US" sz="1400" dirty="0"/>
               <a:t>Test building the default model (“heterogeneity”)</a:t>
             </a:r>
           </a:p>
           <a:p>
             <a:r>
-              <a:rPr lang="en-US" sz="1800" dirty="0">
+              <a:rPr lang="en-US" sz="1400" dirty="0">
                 <a:solidFill>
                   <a:schemeClr val="tx1">
                     <a:alpha val="20000"/>
@@ -13806,7 +15549,7 @@
           </a:p>
           <a:p>
             <a:r>
-              <a:rPr lang="en-US" sz="1800" dirty="0">
+              <a:rPr lang="en-US" sz="1400" dirty="0">
                 <a:solidFill>
                   <a:schemeClr val="tx1">
                     <a:alpha val="20000"/>
@@ -13818,14 +15561,33 @@
           </a:p>
           <a:p>
             <a:r>
-              <a:rPr lang="en-US" sz="1800" dirty="0">
+              <a:rPr lang="en-US" sz="1400" dirty="0" err="1">
                 <a:solidFill>
                   <a:schemeClr val="tx1">
                     <a:alpha val="20000"/>
                   </a:schemeClr>
                 </a:solidFill>
               </a:rPr>
-              <a:t>Git (optional; probably pre-installed)</a:t>
+              <a:t>ImageMagick</a:t>
+            </a:r>
+            <a:endParaRPr lang="en-US" sz="1400" dirty="0">
+              <a:solidFill>
+                <a:schemeClr val="tx1">
+                  <a:alpha val="20000"/>
+                </a:schemeClr>
+              </a:solidFill>
+            </a:endParaRPr>
+          </a:p>
+          <a:p>
+            <a:r>
+              <a:rPr lang="en-US" sz="1400" dirty="0">
+                <a:solidFill>
+                  <a:schemeClr val="tx1">
+                    <a:alpha val="20000"/>
+                  </a:schemeClr>
+                </a:solidFill>
+              </a:rPr>
+              <a:t>PhysiCell Model Builder</a:t>
             </a:r>
           </a:p>
         </p:txBody>
@@ -13833,7 +15595,7 @@
     </p:spTree>
     <p:extLst>
       <p:ext uri="{BB962C8B-B14F-4D97-AF65-F5344CB8AC3E}">
-        <p14:creationId xmlns:p14="http://schemas.microsoft.com/office/powerpoint/2010/main" val="3672300418"/>
+        <p14:creationId xmlns:p14="http://schemas.microsoft.com/office/powerpoint/2010/main" val="3775220851"/>
       </p:ext>
     </p:extLst>
   </p:cSld>
@@ -13951,6 +15713,12 @@
           </a:p>
           <a:p>
             <a:pPr marL="0" indent="0">
+              <a:buNone/>
+            </a:pPr>
+            <a:endParaRPr lang="en-US" sz="1600" dirty="0"/>
+          </a:p>
+          <a:p>
+            <a:pPr marL="0" indent="0">
               <a:spcBef>
                 <a:spcPts val="0"/>
               </a:spcBef>
@@ -13958,7 +15726,11 @@
             </a:pPr>
             <a:r>
               <a:rPr lang="en-US" sz="1200" dirty="0"/>
-              <a:t>~$ cd ~/Downloads/</a:t>
+              <a:t>~$ </a:t>
+            </a:r>
+            <a:r>
+              <a:rPr lang="en-US" sz="1200" b="1" dirty="0"/>
+              <a:t>cd ~/Downloads/</a:t>
             </a:r>
           </a:p>
           <a:p>
@@ -13970,7 +15742,11 @@
             </a:pPr>
             <a:r>
               <a:rPr lang="en-US" sz="1200" dirty="0"/>
-              <a:t>~/Downloads$ ls -l PhysiCell_V.1.9.0.zip </a:t>
+              <a:t>~/Downloads$ </a:t>
+            </a:r>
+            <a:r>
+              <a:rPr lang="en-US" sz="1200" b="1" dirty="0"/>
+              <a:t>ls -l PhysiCell_V.1.9.0.zip </a:t>
             </a:r>
           </a:p>
           <a:p>
@@ -14019,19 +15795,15 @@
             </a:pPr>
             <a:r>
               <a:rPr lang="en-US" sz="1200" dirty="0"/>
-              <a:t>~/Downloads$ mv PhysiCell_V.1.9.0.zip ~    # move this .zip file to your home directory</a:t>
-            </a:r>
-          </a:p>
-          <a:p>
-            <a:pPr marL="0" indent="0">
-              <a:spcBef>
-                <a:spcPts val="0"/>
-              </a:spcBef>
-              <a:buNone/>
-            </a:pPr>
+              <a:t>~/Downloads$ </a:t>
+            </a:r>
+            <a:r>
+              <a:rPr lang="en-US" sz="1200" b="1" dirty="0"/>
+              <a:t>mv PhysiCell_V.1.9.0.zip ~    </a:t>
+            </a:r>
             <a:r>
               <a:rPr lang="en-US" sz="1200" dirty="0"/>
-              <a:t>~/Downloads$ cd ~                                       # change to home directory</a:t>
+              <a:t># move this .zip file to your home directory</a:t>
             </a:r>
           </a:p>
           <a:p>
@@ -14043,19 +15815,47 @@
             </a:pPr>
             <a:r>
               <a:rPr lang="en-US" sz="1200" dirty="0"/>
-              <a:t>~$ unzip -q PhysiCell_V.1.9.0.zip </a:t>
-            </a:r>
-          </a:p>
-          <a:p>
-            <a:pPr marL="0" indent="0">
-              <a:spcBef>
-                <a:spcPts val="0"/>
-              </a:spcBef>
-              <a:buNone/>
-            </a:pPr>
+              <a:t>~/Downloads$ </a:t>
+            </a:r>
+            <a:r>
+              <a:rPr lang="en-US" sz="1200" b="1" dirty="0"/>
+              <a:t>cd ~</a:t>
+            </a:r>
             <a:r>
               <a:rPr lang="en-US" sz="1200" dirty="0"/>
-              <a:t>~$ cd PhysiCell</a:t>
+              <a:t>                                       # change to home directory</a:t>
+            </a:r>
+          </a:p>
+          <a:p>
+            <a:pPr marL="0" indent="0">
+              <a:spcBef>
+                <a:spcPts val="0"/>
+              </a:spcBef>
+              <a:buNone/>
+            </a:pPr>
+            <a:r>
+              <a:rPr lang="en-US" sz="1200" dirty="0"/>
+              <a:t>~$ </a:t>
+            </a:r>
+            <a:r>
+              <a:rPr lang="en-US" sz="1200" b="1" dirty="0"/>
+              <a:t>unzip -q PhysiCell_V.1.9.0.zip </a:t>
+            </a:r>
+          </a:p>
+          <a:p>
+            <a:pPr marL="0" indent="0">
+              <a:spcBef>
+                <a:spcPts val="0"/>
+              </a:spcBef>
+              <a:buNone/>
+            </a:pPr>
+            <a:r>
+              <a:rPr lang="en-US" sz="1200" dirty="0"/>
+              <a:t>~$ </a:t>
+            </a:r>
+            <a:r>
+              <a:rPr lang="en-US" sz="1200" b="1" dirty="0"/>
+              <a:t>cd PhysiCell</a:t>
             </a:r>
           </a:p>
           <a:p>

</xml_diff>